<commit_message>
local commit for remote merge
</commit_message>
<xml_diff>
--- a/documents/UMLx_Introduction_tool.pptx
+++ b/documents/UMLx_Introduction_tool.pptx
@@ -5,7 +5,7 @@
     <p:sldMasterId id="2147483648" r:id="rId1"/>
   </p:sldMasterIdLst>
   <p:notesMasterIdLst>
-    <p:notesMasterId r:id="rId24"/>
+    <p:notesMasterId r:id="rId21"/>
   </p:notesMasterIdLst>
   <p:sldIdLst>
     <p:sldId id="256" r:id="rId2"/>
@@ -14,22 +14,19 @@
     <p:sldId id="259" r:id="rId5"/>
     <p:sldId id="268" r:id="rId6"/>
     <p:sldId id="270" r:id="rId7"/>
-    <p:sldId id="265" r:id="rId8"/>
-    <p:sldId id="269" r:id="rId9"/>
-    <p:sldId id="260" r:id="rId10"/>
-    <p:sldId id="266" r:id="rId11"/>
-    <p:sldId id="261" r:id="rId12"/>
-    <p:sldId id="271" r:id="rId13"/>
-    <p:sldId id="278" r:id="rId14"/>
-    <p:sldId id="262" r:id="rId15"/>
-    <p:sldId id="272" r:id="rId16"/>
-    <p:sldId id="264" r:id="rId17"/>
-    <p:sldId id="263" r:id="rId18"/>
-    <p:sldId id="273" r:id="rId19"/>
-    <p:sldId id="274" r:id="rId20"/>
-    <p:sldId id="275" r:id="rId21"/>
-    <p:sldId id="276" r:id="rId22"/>
-    <p:sldId id="277" r:id="rId23"/>
+    <p:sldId id="262" r:id="rId8"/>
+    <p:sldId id="265" r:id="rId9"/>
+    <p:sldId id="278" r:id="rId10"/>
+    <p:sldId id="272" r:id="rId11"/>
+    <p:sldId id="280" r:id="rId12"/>
+    <p:sldId id="281" r:id="rId13"/>
+    <p:sldId id="264" r:id="rId14"/>
+    <p:sldId id="263" r:id="rId15"/>
+    <p:sldId id="273" r:id="rId16"/>
+    <p:sldId id="274" r:id="rId17"/>
+    <p:sldId id="275" r:id="rId18"/>
+    <p:sldId id="276" r:id="rId19"/>
+    <p:sldId id="277" r:id="rId20"/>
   </p:sldIdLst>
   <p:sldSz cx="12192000" cy="6858000"/>
   <p:notesSz cx="6858000" cy="9144000"/>
@@ -3539,8 +3536,8 @@
           <a:lstStyle/>
           <a:p>
             <a:r>
-              <a:rPr lang="en-US" dirty="0" smtClean="0"/>
-              <a:t>TI Implementation Details</a:t>
+              <a:rPr lang="en-US" smtClean="0"/>
+              <a:t>Requirements/Use Case Prioritization</a:t>
             </a:r>
             <a:endParaRPr lang="en-US" dirty="0"/>
           </a:p>
@@ -3548,80 +3545,37 @@
       </p:sp>
       <p:pic>
         <p:nvPicPr>
-          <p:cNvPr id="4" name="Picture 3"/>
+          <p:cNvPr id="4" name="Content Placeholder 3"/>
           <p:cNvPicPr>
-            <a:picLocks noChangeAspect="1"/>
+            <a:picLocks noGrp="1" noChangeAspect="1"/>
           </p:cNvPicPr>
-          <p:nvPr/>
+          <p:nvPr>
+            <p:ph idx="1"/>
+          </p:nvPr>
         </p:nvPicPr>
         <p:blipFill>
-          <a:blip r:embed="rId2"/>
+          <a:blip r:embed="rId2">
+            <a:extLst>
+              <a:ext uri="{28A0092B-C50C-407E-A947-70E740481C1C}">
+                <a14:useLocalDpi xmlns:a14="http://schemas.microsoft.com/office/drawing/2010/main" val="0"/>
+              </a:ext>
+            </a:extLst>
+          </a:blip>
           <a:stretch>
             <a:fillRect/>
           </a:stretch>
         </p:blipFill>
         <p:spPr>
           <a:xfrm>
-            <a:off x="904309" y="1289364"/>
-            <a:ext cx="2254532" cy="4808617"/>
+            <a:off x="4726709" y="1690688"/>
+            <a:ext cx="3304281" cy="4351338"/>
           </a:xfrm>
-          <a:prstGeom prst="rect">
-            <a:avLst/>
-          </a:prstGeom>
-        </p:spPr>
-      </p:pic>
-      <p:pic>
-        <p:nvPicPr>
-          <p:cNvPr id="5" name="Picture 4"/>
-          <p:cNvPicPr>
-            <a:picLocks noChangeAspect="1"/>
-          </p:cNvPicPr>
-          <p:nvPr/>
-        </p:nvPicPr>
-        <p:blipFill>
-          <a:blip r:embed="rId3"/>
-          <a:stretch>
-            <a:fillRect/>
-          </a:stretch>
-        </p:blipFill>
-        <p:spPr>
-          <a:xfrm>
-            <a:off x="3029279" y="1289364"/>
-            <a:ext cx="4679039" cy="4943474"/>
-          </a:xfrm>
-          <a:prstGeom prst="rect">
-            <a:avLst/>
-          </a:prstGeom>
-        </p:spPr>
-      </p:pic>
-      <p:pic>
-        <p:nvPicPr>
-          <p:cNvPr id="6" name="Picture 5"/>
-          <p:cNvPicPr>
-            <a:picLocks noChangeAspect="1"/>
-          </p:cNvPicPr>
-          <p:nvPr/>
-        </p:nvPicPr>
-        <p:blipFill>
-          <a:blip r:embed="rId4"/>
-          <a:stretch>
-            <a:fillRect/>
-          </a:stretch>
-        </p:blipFill>
-        <p:spPr>
-          <a:xfrm>
-            <a:off x="6822635" y="1198829"/>
-            <a:ext cx="3122029" cy="3380807"/>
-          </a:xfrm>
-          <a:prstGeom prst="rect">
-            <a:avLst/>
-          </a:prstGeom>
         </p:spPr>
       </p:pic>
     </p:spTree>
     <p:extLst>
       <p:ext uri="{BB962C8B-B14F-4D97-AF65-F5344CB8AC3E}">
-        <p14:creationId xmlns:p14="http://schemas.microsoft.com/office/powerpoint/2010/main" val="508499145"/>
+        <p14:creationId xmlns:p14="http://schemas.microsoft.com/office/powerpoint/2010/main" val="3064012165"/>
       </p:ext>
     </p:extLst>
   </p:cSld>
@@ -3671,8 +3625,8 @@
           <a:lstStyle/>
           <a:p>
             <a:r>
-              <a:rPr lang="en-US" dirty="0" smtClean="0"/>
-              <a:t>TC Transaction Classification</a:t>
+              <a:rPr lang="en-US" smtClean="0"/>
+              <a:t>Resources/Personnel Allocation</a:t>
             </a:r>
             <a:endParaRPr lang="en-US" dirty="0"/>
           </a:p>
@@ -3689,55 +3643,28 @@
           </p:nvPr>
         </p:nvPicPr>
         <p:blipFill>
-          <a:blip r:embed="rId2"/>
+          <a:blip r:embed="rId2">
+            <a:extLst>
+              <a:ext uri="{28A0092B-C50C-407E-A947-70E740481C1C}">
+                <a14:useLocalDpi xmlns:a14="http://schemas.microsoft.com/office/drawing/2010/main" val="0"/>
+              </a:ext>
+            </a:extLst>
+          </a:blip>
           <a:stretch>
             <a:fillRect/>
           </a:stretch>
         </p:blipFill>
         <p:spPr>
           <a:xfrm>
-            <a:off x="5911913" y="1690688"/>
-            <a:ext cx="4903064" cy="2566839"/>
+            <a:off x="4939146" y="1552142"/>
+            <a:ext cx="3304281" cy="4351338"/>
           </a:xfrm>
-          <a:prstGeom prst="rect">
-            <a:avLst/>
-          </a:prstGeom>
         </p:spPr>
       </p:pic>
-      <p:sp>
-        <p:nvSpPr>
-          <p:cNvPr id="5" name="TextBox 4"/>
-          <p:cNvSpPr txBox="1"/>
-          <p:nvPr/>
-        </p:nvSpPr>
-        <p:spPr>
-          <a:xfrm>
-            <a:off x="838200" y="1772169"/>
-            <a:ext cx="4621040" cy="1200329"/>
-          </a:xfrm>
-          <a:prstGeom prst="rect">
-            <a:avLst/>
-          </a:prstGeom>
-          <a:noFill/>
-        </p:spPr>
-        <p:txBody>
-          <a:bodyPr wrap="square" rtlCol="0">
-            <a:spAutoFit/>
-          </a:bodyPr>
-          <a:lstStyle/>
-          <a:p>
-            <a:r>
-              <a:rPr lang="en-US" dirty="0" smtClean="0"/>
-              <a:t>1. Transactions are classified by interface, operational, data complexity, which are evaluated by the metrics defined based on the properties extracted from UML diagrams.</a:t>
-            </a:r>
-            <a:endParaRPr lang="en-US" dirty="0"/>
-          </a:p>
-        </p:txBody>
-      </p:sp>
     </p:spTree>
     <p:extLst>
       <p:ext uri="{BB962C8B-B14F-4D97-AF65-F5344CB8AC3E}">
-        <p14:creationId xmlns:p14="http://schemas.microsoft.com/office/powerpoint/2010/main" val="510204049"/>
+        <p14:creationId xmlns:p14="http://schemas.microsoft.com/office/powerpoint/2010/main" val="585222607"/>
       </p:ext>
     </p:extLst>
   </p:cSld>
@@ -3787,10 +3714,10 @@
           <a:lstStyle/>
           <a:p>
             <a:r>
-              <a:rPr lang="en-US" dirty="0" smtClean="0"/>
-              <a:t>TC Implementation Detail</a:t>
-            </a:r>
-            <a:endParaRPr lang="en-US" dirty="0"/>
+              <a:rPr lang="en-US" smtClean="0"/>
+              <a:t>Feability/Risk Analysis</a:t>
+            </a:r>
+            <a:endParaRPr lang="en-US"/>
           </a:p>
         </p:txBody>
       </p:sp>
@@ -3804,65 +3731,25 @@
             <p:ph idx="1"/>
           </p:nvPr>
         </p:nvSpPr>
-        <p:spPr>
-          <a:xfrm>
-            <a:off x="838199" y="1825625"/>
-            <a:ext cx="6630909" cy="501116"/>
-          </a:xfrm>
-        </p:spPr>
-        <p:txBody>
-          <a:bodyPr/>
-          <a:lstStyle/>
-          <a:p>
-            <a:r>
-              <a:rPr lang="en-US" dirty="0" smtClean="0"/>
-              <a:t>Encapsulated in the transaction evaluator.</a:t>
-            </a:r>
-            <a:endParaRPr lang="en-US" dirty="0"/>
-          </a:p>
-        </p:txBody>
-      </p:sp>
-      <p:pic>
-        <p:nvPicPr>
-          <p:cNvPr id="4" name="Picture 3"/>
-          <p:cNvPicPr>
-            <a:picLocks noChangeAspect="1"/>
-          </p:cNvPicPr>
-          <p:nvPr/>
-        </p:nvPicPr>
-        <p:blipFill>
-          <a:blip r:embed="rId2"/>
-          <a:stretch>
-            <a:fillRect/>
-          </a:stretch>
-        </p:blipFill>
-        <p:spPr>
-          <a:xfrm>
-            <a:off x="7820260" y="1919570"/>
-            <a:ext cx="2943225" cy="2276475"/>
-          </a:xfrm>
-          <a:prstGeom prst="rect">
-            <a:avLst/>
-          </a:prstGeom>
-        </p:spPr>
-      </p:pic>
+        <p:spPr/>
+        <p:txBody>
+          <a:bodyPr/>
+          <a:lstStyle/>
+          <a:p>
+            <a:endParaRPr lang="en-US"/>
+          </a:p>
+        </p:txBody>
+      </p:sp>
     </p:spTree>
     <p:extLst>
       <p:ext uri="{BB962C8B-B14F-4D97-AF65-F5344CB8AC3E}">
-        <p14:creationId xmlns:p14="http://schemas.microsoft.com/office/powerpoint/2010/main" val="1708257190"/>
+        <p14:creationId xmlns:p14="http://schemas.microsoft.com/office/powerpoint/2010/main" val="4225962535"/>
       </p:ext>
     </p:extLst>
   </p:cSld>
   <p:clrMapOvr>
     <a:masterClrMapping/>
   </p:clrMapOvr>
-  <p:timing>
-    <p:tnLst>
-      <p:par>
-        <p:cTn id="1" dur="indefinite" restart="never" nodeType="tmRoot"/>
-      </p:par>
-    </p:tnLst>
-  </p:timing>
 </p:sld>
 </file>
 
@@ -3899,16 +3786,1089 @@
           <a:lstStyle/>
           <a:p>
             <a:r>
-              <a:rPr lang="en-US" smtClean="0"/>
-              <a:t>Code Analysis</a:t>
-            </a:r>
-            <a:endParaRPr lang="en-US"/>
+              <a:rPr lang="en-US" dirty="0" smtClean="0"/>
+              <a:t>Tasks</a:t>
+            </a:r>
+            <a:endParaRPr lang="en-US" dirty="0"/>
+          </a:p>
+        </p:txBody>
+      </p:sp>
+      <p:sp>
+        <p:nvSpPr>
+          <p:cNvPr id="3" name="Content Placeholder 2"/>
+          <p:cNvSpPr>
+            <a:spLocks noGrp="1"/>
+          </p:cNvSpPr>
+          <p:nvPr>
+            <p:ph idx="1"/>
+          </p:nvPr>
+        </p:nvSpPr>
+        <p:spPr/>
+        <p:txBody>
+          <a:bodyPr/>
+          <a:lstStyle/>
+          <a:p>
+            <a:r>
+              <a:rPr lang="en-US" dirty="0" smtClean="0"/>
+              <a:t>The code pieces, analytical scripts, data are not fully integrated.</a:t>
+            </a:r>
+          </a:p>
+          <a:p>
+            <a:r>
+              <a:rPr lang="en-US" dirty="0" smtClean="0"/>
+              <a:t>Better structure of the framework to streamline the data processing procedure.</a:t>
+            </a:r>
+          </a:p>
+          <a:p>
+            <a:r>
+              <a:rPr lang="en-US" dirty="0" smtClean="0"/>
+              <a:t>Better ways to visualize the data and models. Some visualizations are not fully integrated to the web page.</a:t>
+            </a:r>
+          </a:p>
+          <a:p>
+            <a:r>
+              <a:rPr lang="en-US" dirty="0" smtClean="0"/>
+              <a:t>Explore model calibration and evaluation models.</a:t>
+            </a:r>
+            <a:endParaRPr lang="en-US" dirty="0"/>
+          </a:p>
+        </p:txBody>
+      </p:sp>
+    </p:spTree>
+    <p:extLst>
+      <p:ext uri="{BB962C8B-B14F-4D97-AF65-F5344CB8AC3E}">
+        <p14:creationId xmlns:p14="http://schemas.microsoft.com/office/powerpoint/2010/main" val="2577662836"/>
+      </p:ext>
+    </p:extLst>
+  </p:cSld>
+  <p:clrMapOvr>
+    <a:masterClrMapping/>
+  </p:clrMapOvr>
+  <p:timing>
+    <p:tnLst>
+      <p:par>
+        <p:cTn id="1" dur="indefinite" restart="never" nodeType="tmRoot"/>
+      </p:par>
+    </p:tnLst>
+  </p:timing>
+</p:sld>
+</file>
+
+<file path=ppt/slides/slide14.xml><?xml version="1.0" encoding="utf-8"?>
+<p:sld xmlns:a="http://schemas.openxmlformats.org/drawingml/2006/main" xmlns:r="http://schemas.openxmlformats.org/officeDocument/2006/relationships" xmlns:p="http://schemas.openxmlformats.org/presentationml/2006/main">
+  <p:cSld>
+    <p:spTree>
+      <p:nvGrpSpPr>
+        <p:cNvPr id="1" name=""/>
+        <p:cNvGrpSpPr/>
+        <p:nvPr/>
+      </p:nvGrpSpPr>
+      <p:grpSpPr>
+        <a:xfrm>
+          <a:off x="0" y="0"/>
+          <a:ext cx="0" cy="0"/>
+          <a:chOff x="0" y="0"/>
+          <a:chExt cx="0" cy="0"/>
+        </a:xfrm>
+      </p:grpSpPr>
+      <p:sp>
+        <p:nvSpPr>
+          <p:cNvPr id="2" name="Title 1"/>
+          <p:cNvSpPr>
+            <a:spLocks noGrp="1"/>
+          </p:cNvSpPr>
+          <p:nvPr>
+            <p:ph type="title"/>
+          </p:nvPr>
+        </p:nvSpPr>
+        <p:spPr/>
+        <p:txBody>
+          <a:bodyPr/>
+          <a:lstStyle/>
+          <a:p>
+            <a:r>
+              <a:rPr lang="en-US" dirty="0" smtClean="0"/>
+              <a:t>Questions?</a:t>
+            </a:r>
+            <a:endParaRPr lang="en-US" dirty="0"/>
+          </a:p>
+        </p:txBody>
+      </p:sp>
+    </p:spTree>
+    <p:extLst>
+      <p:ext uri="{BB962C8B-B14F-4D97-AF65-F5344CB8AC3E}">
+        <p14:creationId xmlns:p14="http://schemas.microsoft.com/office/powerpoint/2010/main" val="2432225347"/>
+      </p:ext>
+    </p:extLst>
+  </p:cSld>
+  <p:clrMapOvr>
+    <a:masterClrMapping/>
+  </p:clrMapOvr>
+  <p:timing>
+    <p:tnLst>
+      <p:par>
+        <p:cTn id="1" dur="indefinite" restart="never" nodeType="tmRoot"/>
+      </p:par>
+    </p:tnLst>
+  </p:timing>
+</p:sld>
+</file>
+
+<file path=ppt/slides/slide15.xml><?xml version="1.0" encoding="utf-8"?>
+<p:sld xmlns:a="http://schemas.openxmlformats.org/drawingml/2006/main" xmlns:r="http://schemas.openxmlformats.org/officeDocument/2006/relationships" xmlns:p="http://schemas.openxmlformats.org/presentationml/2006/main">
+  <p:cSld>
+    <p:spTree>
+      <p:nvGrpSpPr>
+        <p:cNvPr id="1" name=""/>
+        <p:cNvGrpSpPr/>
+        <p:nvPr/>
+      </p:nvGrpSpPr>
+      <p:grpSpPr>
+        <a:xfrm>
+          <a:off x="0" y="0"/>
+          <a:ext cx="0" cy="0"/>
+          <a:chOff x="0" y="0"/>
+          <a:chExt cx="0" cy="0"/>
+        </a:xfrm>
+      </p:grpSpPr>
+      <p:sp>
+        <p:nvSpPr>
+          <p:cNvPr id="2" name="Title 1"/>
+          <p:cNvSpPr>
+            <a:spLocks noGrp="1"/>
+          </p:cNvSpPr>
+          <p:nvPr>
+            <p:ph type="title"/>
+          </p:nvPr>
+        </p:nvSpPr>
+        <p:spPr/>
+        <p:txBody>
+          <a:bodyPr/>
+          <a:lstStyle/>
+          <a:p>
+            <a:r>
+              <a:rPr lang="en-US" dirty="0" smtClean="0"/>
+              <a:t>Screenshots</a:t>
+            </a:r>
+            <a:endParaRPr lang="en-US" dirty="0"/>
           </a:p>
         </p:txBody>
       </p:sp>
       <p:pic>
         <p:nvPicPr>
           <p:cNvPr id="4" name="Content Placeholder 3"/>
+          <p:cNvPicPr>
+            <a:picLocks noGrp="1" noChangeAspect="1"/>
+          </p:cNvPicPr>
+          <p:nvPr>
+            <p:ph idx="1"/>
+          </p:nvPr>
+        </p:nvPicPr>
+        <p:blipFill>
+          <a:blip r:embed="rId2">
+            <a:extLst>
+              <a:ext uri="{28A0092B-C50C-407E-A947-70E740481C1C}">
+                <a14:useLocalDpi xmlns:a14="http://schemas.microsoft.com/office/drawing/2010/main" val="0"/>
+              </a:ext>
+            </a:extLst>
+          </a:blip>
+          <a:stretch>
+            <a:fillRect/>
+          </a:stretch>
+        </p:blipFill>
+        <p:spPr>
+          <a:xfrm>
+            <a:off x="2079380" y="1825625"/>
+            <a:ext cx="8033239" cy="4351338"/>
+          </a:xfrm>
+        </p:spPr>
+      </p:pic>
+    </p:spTree>
+    <p:extLst>
+      <p:ext uri="{BB962C8B-B14F-4D97-AF65-F5344CB8AC3E}">
+        <p14:creationId xmlns:p14="http://schemas.microsoft.com/office/powerpoint/2010/main" val="304617625"/>
+      </p:ext>
+    </p:extLst>
+  </p:cSld>
+  <p:clrMapOvr>
+    <a:masterClrMapping/>
+  </p:clrMapOvr>
+  <p:timing>
+    <p:tnLst>
+      <p:par>
+        <p:cTn id="1" dur="indefinite" restart="never" nodeType="tmRoot"/>
+      </p:par>
+    </p:tnLst>
+  </p:timing>
+</p:sld>
+</file>
+
+<file path=ppt/slides/slide16.xml><?xml version="1.0" encoding="utf-8"?>
+<p:sld xmlns:a="http://schemas.openxmlformats.org/drawingml/2006/main" xmlns:r="http://schemas.openxmlformats.org/officeDocument/2006/relationships" xmlns:p="http://schemas.openxmlformats.org/presentationml/2006/main">
+  <p:cSld>
+    <p:spTree>
+      <p:nvGrpSpPr>
+        <p:cNvPr id="1" name=""/>
+        <p:cNvGrpSpPr/>
+        <p:nvPr/>
+      </p:nvGrpSpPr>
+      <p:grpSpPr>
+        <a:xfrm>
+          <a:off x="0" y="0"/>
+          <a:ext cx="0" cy="0"/>
+          <a:chOff x="0" y="0"/>
+          <a:chExt cx="0" cy="0"/>
+        </a:xfrm>
+      </p:grpSpPr>
+      <p:sp>
+        <p:nvSpPr>
+          <p:cNvPr id="2" name="Title 1"/>
+          <p:cNvSpPr>
+            <a:spLocks noGrp="1"/>
+          </p:cNvSpPr>
+          <p:nvPr>
+            <p:ph type="title"/>
+          </p:nvPr>
+        </p:nvSpPr>
+        <p:spPr/>
+        <p:txBody>
+          <a:bodyPr/>
+          <a:lstStyle/>
+          <a:p>
+            <a:r>
+              <a:rPr lang="en-US" dirty="0" smtClean="0"/>
+              <a:t>Screenshots</a:t>
+            </a:r>
+            <a:endParaRPr lang="en-US" dirty="0"/>
+          </a:p>
+        </p:txBody>
+      </p:sp>
+      <p:pic>
+        <p:nvPicPr>
+          <p:cNvPr id="5" name="Content Placeholder 4"/>
+          <p:cNvPicPr>
+            <a:picLocks noGrp="1" noChangeAspect="1"/>
+          </p:cNvPicPr>
+          <p:nvPr>
+            <p:ph idx="1"/>
+          </p:nvPr>
+        </p:nvPicPr>
+        <p:blipFill>
+          <a:blip r:embed="rId2">
+            <a:extLst>
+              <a:ext uri="{28A0092B-C50C-407E-A947-70E740481C1C}">
+                <a14:useLocalDpi xmlns:a14="http://schemas.microsoft.com/office/drawing/2010/main" val="0"/>
+              </a:ext>
+            </a:extLst>
+          </a:blip>
+          <a:stretch>
+            <a:fillRect/>
+          </a:stretch>
+        </p:blipFill>
+        <p:spPr>
+          <a:xfrm>
+            <a:off x="2079380" y="1825625"/>
+            <a:ext cx="8033239" cy="4351338"/>
+          </a:xfrm>
+        </p:spPr>
+      </p:pic>
+    </p:spTree>
+    <p:extLst>
+      <p:ext uri="{BB962C8B-B14F-4D97-AF65-F5344CB8AC3E}">
+        <p14:creationId xmlns:p14="http://schemas.microsoft.com/office/powerpoint/2010/main" val="1660463960"/>
+      </p:ext>
+    </p:extLst>
+  </p:cSld>
+  <p:clrMapOvr>
+    <a:masterClrMapping/>
+  </p:clrMapOvr>
+  <p:timing>
+    <p:tnLst>
+      <p:par>
+        <p:cTn id="1" dur="indefinite" restart="never" nodeType="tmRoot"/>
+      </p:par>
+    </p:tnLst>
+  </p:timing>
+</p:sld>
+</file>
+
+<file path=ppt/slides/slide17.xml><?xml version="1.0" encoding="utf-8"?>
+<p:sld xmlns:a="http://schemas.openxmlformats.org/drawingml/2006/main" xmlns:r="http://schemas.openxmlformats.org/officeDocument/2006/relationships" xmlns:p="http://schemas.openxmlformats.org/presentationml/2006/main">
+  <p:cSld>
+    <p:spTree>
+      <p:nvGrpSpPr>
+        <p:cNvPr id="1" name=""/>
+        <p:cNvGrpSpPr/>
+        <p:nvPr/>
+      </p:nvGrpSpPr>
+      <p:grpSpPr>
+        <a:xfrm>
+          <a:off x="0" y="0"/>
+          <a:ext cx="0" cy="0"/>
+          <a:chOff x="0" y="0"/>
+          <a:chExt cx="0" cy="0"/>
+        </a:xfrm>
+      </p:grpSpPr>
+      <p:sp>
+        <p:nvSpPr>
+          <p:cNvPr id="2" name="Title 1"/>
+          <p:cNvSpPr>
+            <a:spLocks noGrp="1"/>
+          </p:cNvSpPr>
+          <p:nvPr>
+            <p:ph type="title"/>
+          </p:nvPr>
+        </p:nvSpPr>
+        <p:spPr/>
+        <p:txBody>
+          <a:bodyPr/>
+          <a:lstStyle/>
+          <a:p>
+            <a:r>
+              <a:rPr lang="en-US" dirty="0" smtClean="0"/>
+              <a:t>Screenshots</a:t>
+            </a:r>
+            <a:endParaRPr lang="en-US" dirty="0"/>
+          </a:p>
+        </p:txBody>
+      </p:sp>
+      <p:pic>
+        <p:nvPicPr>
+          <p:cNvPr id="5" name="Content Placeholder 4"/>
+          <p:cNvPicPr>
+            <a:picLocks noGrp="1" noChangeAspect="1"/>
+          </p:cNvPicPr>
+          <p:nvPr>
+            <p:ph idx="1"/>
+          </p:nvPr>
+        </p:nvPicPr>
+        <p:blipFill>
+          <a:blip r:embed="rId2">
+            <a:extLst>
+              <a:ext uri="{28A0092B-C50C-407E-A947-70E740481C1C}">
+                <a14:useLocalDpi xmlns:a14="http://schemas.microsoft.com/office/drawing/2010/main" val="0"/>
+              </a:ext>
+            </a:extLst>
+          </a:blip>
+          <a:stretch>
+            <a:fillRect/>
+          </a:stretch>
+        </p:blipFill>
+        <p:spPr>
+          <a:xfrm>
+            <a:off x="2079380" y="1825625"/>
+            <a:ext cx="8033239" cy="4351338"/>
+          </a:xfrm>
+        </p:spPr>
+      </p:pic>
+    </p:spTree>
+    <p:extLst>
+      <p:ext uri="{BB962C8B-B14F-4D97-AF65-F5344CB8AC3E}">
+        <p14:creationId xmlns:p14="http://schemas.microsoft.com/office/powerpoint/2010/main" val="2918428292"/>
+      </p:ext>
+    </p:extLst>
+  </p:cSld>
+  <p:clrMapOvr>
+    <a:masterClrMapping/>
+  </p:clrMapOvr>
+  <p:timing>
+    <p:tnLst>
+      <p:par>
+        <p:cTn id="1" dur="indefinite" restart="never" nodeType="tmRoot"/>
+      </p:par>
+    </p:tnLst>
+  </p:timing>
+</p:sld>
+</file>
+
+<file path=ppt/slides/slide18.xml><?xml version="1.0" encoding="utf-8"?>
+<p:sld xmlns:a="http://schemas.openxmlformats.org/drawingml/2006/main" xmlns:r="http://schemas.openxmlformats.org/officeDocument/2006/relationships" xmlns:p="http://schemas.openxmlformats.org/presentationml/2006/main">
+  <p:cSld>
+    <p:spTree>
+      <p:nvGrpSpPr>
+        <p:cNvPr id="1" name=""/>
+        <p:cNvGrpSpPr/>
+        <p:nvPr/>
+      </p:nvGrpSpPr>
+      <p:grpSpPr>
+        <a:xfrm>
+          <a:off x="0" y="0"/>
+          <a:ext cx="0" cy="0"/>
+          <a:chOff x="0" y="0"/>
+          <a:chExt cx="0" cy="0"/>
+        </a:xfrm>
+      </p:grpSpPr>
+      <p:sp>
+        <p:nvSpPr>
+          <p:cNvPr id="2" name="Title 1"/>
+          <p:cNvSpPr>
+            <a:spLocks noGrp="1"/>
+          </p:cNvSpPr>
+          <p:nvPr>
+            <p:ph type="title"/>
+          </p:nvPr>
+        </p:nvSpPr>
+        <p:spPr/>
+        <p:txBody>
+          <a:bodyPr/>
+          <a:lstStyle/>
+          <a:p>
+            <a:r>
+              <a:rPr lang="en-US" dirty="0" smtClean="0"/>
+              <a:t>Screenshots</a:t>
+            </a:r>
+            <a:endParaRPr lang="en-US" dirty="0"/>
+          </a:p>
+        </p:txBody>
+      </p:sp>
+      <p:pic>
+        <p:nvPicPr>
+          <p:cNvPr id="5" name="Content Placeholder 4"/>
+          <p:cNvPicPr>
+            <a:picLocks noGrp="1" noChangeAspect="1"/>
+          </p:cNvPicPr>
+          <p:nvPr>
+            <p:ph idx="1"/>
+          </p:nvPr>
+        </p:nvPicPr>
+        <p:blipFill>
+          <a:blip r:embed="rId2">
+            <a:extLst>
+              <a:ext uri="{28A0092B-C50C-407E-A947-70E740481C1C}">
+                <a14:useLocalDpi xmlns:a14="http://schemas.microsoft.com/office/drawing/2010/main" val="0"/>
+              </a:ext>
+            </a:extLst>
+          </a:blip>
+          <a:stretch>
+            <a:fillRect/>
+          </a:stretch>
+        </p:blipFill>
+        <p:spPr>
+          <a:xfrm>
+            <a:off x="2079380" y="1825625"/>
+            <a:ext cx="8033239" cy="4351338"/>
+          </a:xfrm>
+        </p:spPr>
+      </p:pic>
+    </p:spTree>
+    <p:extLst>
+      <p:ext uri="{BB962C8B-B14F-4D97-AF65-F5344CB8AC3E}">
+        <p14:creationId xmlns:p14="http://schemas.microsoft.com/office/powerpoint/2010/main" val="1029340432"/>
+      </p:ext>
+    </p:extLst>
+  </p:cSld>
+  <p:clrMapOvr>
+    <a:masterClrMapping/>
+  </p:clrMapOvr>
+  <p:timing>
+    <p:tnLst>
+      <p:par>
+        <p:cTn id="1" dur="indefinite" restart="never" nodeType="tmRoot"/>
+      </p:par>
+    </p:tnLst>
+  </p:timing>
+</p:sld>
+</file>
+
+<file path=ppt/slides/slide19.xml><?xml version="1.0" encoding="utf-8"?>
+<p:sld xmlns:a="http://schemas.openxmlformats.org/drawingml/2006/main" xmlns:r="http://schemas.openxmlformats.org/officeDocument/2006/relationships" xmlns:p="http://schemas.openxmlformats.org/presentationml/2006/main">
+  <p:cSld>
+    <p:spTree>
+      <p:nvGrpSpPr>
+        <p:cNvPr id="1" name=""/>
+        <p:cNvGrpSpPr/>
+        <p:nvPr/>
+      </p:nvGrpSpPr>
+      <p:grpSpPr>
+        <a:xfrm>
+          <a:off x="0" y="0"/>
+          <a:ext cx="0" cy="0"/>
+          <a:chOff x="0" y="0"/>
+          <a:chExt cx="0" cy="0"/>
+        </a:xfrm>
+      </p:grpSpPr>
+      <p:sp>
+        <p:nvSpPr>
+          <p:cNvPr id="2" name="Title 1"/>
+          <p:cNvSpPr>
+            <a:spLocks noGrp="1"/>
+          </p:cNvSpPr>
+          <p:nvPr>
+            <p:ph type="title"/>
+          </p:nvPr>
+        </p:nvSpPr>
+        <p:spPr/>
+        <p:txBody>
+          <a:bodyPr/>
+          <a:lstStyle/>
+          <a:p>
+            <a:r>
+              <a:rPr lang="en-US" dirty="0" smtClean="0"/>
+              <a:t>Screenshots</a:t>
+            </a:r>
+            <a:endParaRPr lang="en-US" dirty="0"/>
+          </a:p>
+        </p:txBody>
+      </p:sp>
+      <p:pic>
+        <p:nvPicPr>
+          <p:cNvPr id="4" name="Content Placeholder 3"/>
+          <p:cNvPicPr>
+            <a:picLocks noGrp="1" noChangeAspect="1"/>
+          </p:cNvPicPr>
+          <p:nvPr>
+            <p:ph idx="1"/>
+          </p:nvPr>
+        </p:nvPicPr>
+        <p:blipFill>
+          <a:blip r:embed="rId2">
+            <a:extLst>
+              <a:ext uri="{28A0092B-C50C-407E-A947-70E740481C1C}">
+                <a14:useLocalDpi xmlns:a14="http://schemas.microsoft.com/office/drawing/2010/main" val="0"/>
+              </a:ext>
+            </a:extLst>
+          </a:blip>
+          <a:stretch>
+            <a:fillRect/>
+          </a:stretch>
+        </p:blipFill>
+        <p:spPr>
+          <a:xfrm>
+            <a:off x="2079380" y="1825625"/>
+            <a:ext cx="8033239" cy="4351338"/>
+          </a:xfrm>
+        </p:spPr>
+      </p:pic>
+    </p:spTree>
+    <p:extLst>
+      <p:ext uri="{BB962C8B-B14F-4D97-AF65-F5344CB8AC3E}">
+        <p14:creationId xmlns:p14="http://schemas.microsoft.com/office/powerpoint/2010/main" val="1729282589"/>
+      </p:ext>
+    </p:extLst>
+  </p:cSld>
+  <p:clrMapOvr>
+    <a:masterClrMapping/>
+  </p:clrMapOvr>
+  <p:timing>
+    <p:tnLst>
+      <p:par>
+        <p:cTn id="1" dur="indefinite" restart="never" nodeType="tmRoot"/>
+      </p:par>
+    </p:tnLst>
+  </p:timing>
+</p:sld>
+</file>
+
+<file path=ppt/slides/slide2.xml><?xml version="1.0" encoding="utf-8"?>
+<p:sld xmlns:a="http://schemas.openxmlformats.org/drawingml/2006/main" xmlns:r="http://schemas.openxmlformats.org/officeDocument/2006/relationships" xmlns:p="http://schemas.openxmlformats.org/presentationml/2006/main">
+  <p:cSld>
+    <p:spTree>
+      <p:nvGrpSpPr>
+        <p:cNvPr id="1" name=""/>
+        <p:cNvGrpSpPr/>
+        <p:nvPr/>
+      </p:nvGrpSpPr>
+      <p:grpSpPr>
+        <a:xfrm>
+          <a:off x="0" y="0"/>
+          <a:ext cx="0" cy="0"/>
+          <a:chOff x="0" y="0"/>
+          <a:chExt cx="0" cy="0"/>
+        </a:xfrm>
+      </p:grpSpPr>
+      <p:sp>
+        <p:nvSpPr>
+          <p:cNvPr id="2" name="Title 1"/>
+          <p:cNvSpPr>
+            <a:spLocks noGrp="1"/>
+          </p:cNvSpPr>
+          <p:nvPr>
+            <p:ph type="title"/>
+          </p:nvPr>
+        </p:nvSpPr>
+        <p:spPr/>
+        <p:txBody>
+          <a:bodyPr/>
+          <a:lstStyle/>
+          <a:p>
+            <a:r>
+              <a:rPr lang="en-US" dirty="0" smtClean="0"/>
+              <a:t>Purposes</a:t>
+            </a:r>
+            <a:endParaRPr lang="en-US" dirty="0"/>
+          </a:p>
+        </p:txBody>
+      </p:sp>
+      <p:sp>
+        <p:nvSpPr>
+          <p:cNvPr id="3" name="Content Placeholder 2"/>
+          <p:cNvSpPr>
+            <a:spLocks noGrp="1"/>
+          </p:cNvSpPr>
+          <p:nvPr>
+            <p:ph idx="1"/>
+          </p:nvPr>
+        </p:nvSpPr>
+        <p:spPr/>
+        <p:txBody>
+          <a:bodyPr/>
+          <a:lstStyle/>
+          <a:p>
+            <a:r>
+              <a:rPr lang="en-US" dirty="0" smtClean="0"/>
+              <a:t>Work as data mining platform to extract useful information that can facilitate decision making in software engineering.</a:t>
+            </a:r>
+          </a:p>
+          <a:p>
+            <a:pPr lvl="1"/>
+            <a:r>
+              <a:rPr lang="en-US" dirty="0" smtClean="0"/>
+              <a:t>Software size metrics for scope management, resource allocation, etc.</a:t>
+            </a:r>
+          </a:p>
+          <a:p>
+            <a:pPr lvl="1"/>
+            <a:r>
+              <a:rPr lang="en-US" dirty="0" smtClean="0"/>
+              <a:t>Effort estimation for planning, risk mitigation, task assignment, etc.</a:t>
+            </a:r>
+          </a:p>
+          <a:p>
+            <a:pPr lvl="1"/>
+            <a:r>
+              <a:rPr lang="en-US" dirty="0" smtClean="0"/>
+              <a:t>Software understanding for testing, maintenance, and architecture, etc.</a:t>
+            </a:r>
+          </a:p>
+        </p:txBody>
+      </p:sp>
+    </p:spTree>
+    <p:extLst>
+      <p:ext uri="{BB962C8B-B14F-4D97-AF65-F5344CB8AC3E}">
+        <p14:creationId xmlns:p14="http://schemas.microsoft.com/office/powerpoint/2010/main" val="1918546338"/>
+      </p:ext>
+    </p:extLst>
+  </p:cSld>
+  <p:clrMapOvr>
+    <a:masterClrMapping/>
+  </p:clrMapOvr>
+  <p:timing>
+    <p:tnLst>
+      <p:par>
+        <p:cTn id="1" dur="indefinite" restart="never" nodeType="tmRoot"/>
+      </p:par>
+    </p:tnLst>
+  </p:timing>
+</p:sld>
+</file>
+
+<file path=ppt/slides/slide3.xml><?xml version="1.0" encoding="utf-8"?>
+<p:sld xmlns:a="http://schemas.openxmlformats.org/drawingml/2006/main" xmlns:r="http://schemas.openxmlformats.org/officeDocument/2006/relationships" xmlns:p="http://schemas.openxmlformats.org/presentationml/2006/main">
+  <p:cSld>
+    <p:spTree>
+      <p:nvGrpSpPr>
+        <p:cNvPr id="1" name=""/>
+        <p:cNvGrpSpPr/>
+        <p:nvPr/>
+      </p:nvGrpSpPr>
+      <p:grpSpPr>
+        <a:xfrm>
+          <a:off x="0" y="0"/>
+          <a:ext cx="0" cy="0"/>
+          <a:chOff x="0" y="0"/>
+          <a:chExt cx="0" cy="0"/>
+        </a:xfrm>
+      </p:grpSpPr>
+      <p:sp>
+        <p:nvSpPr>
+          <p:cNvPr id="2" name="Title 1"/>
+          <p:cNvSpPr>
+            <a:spLocks noGrp="1"/>
+          </p:cNvSpPr>
+          <p:nvPr>
+            <p:ph type="title"/>
+          </p:nvPr>
+        </p:nvSpPr>
+        <p:spPr/>
+        <p:txBody>
+          <a:bodyPr/>
+          <a:lstStyle/>
+          <a:p>
+            <a:r>
+              <a:rPr lang="en-US" dirty="0" smtClean="0"/>
+              <a:t>The approaches</a:t>
+            </a:r>
+            <a:endParaRPr lang="en-US" dirty="0"/>
+          </a:p>
+        </p:txBody>
+      </p:sp>
+      <p:sp>
+        <p:nvSpPr>
+          <p:cNvPr id="3" name="Content Placeholder 2"/>
+          <p:cNvSpPr>
+            <a:spLocks noGrp="1"/>
+          </p:cNvSpPr>
+          <p:nvPr>
+            <p:ph idx="1"/>
+          </p:nvPr>
+        </p:nvSpPr>
+        <p:spPr/>
+        <p:txBody>
+          <a:bodyPr>
+            <a:normAutofit fontScale="85000" lnSpcReduction="20000"/>
+          </a:bodyPr>
+          <a:lstStyle/>
+          <a:p>
+            <a:r>
+              <a:rPr lang="en-US" smtClean="0"/>
+              <a:t>Automated </a:t>
+            </a:r>
+            <a:r>
+              <a:rPr lang="en-US" smtClean="0"/>
+              <a:t>Software </a:t>
+            </a:r>
+            <a:r>
+              <a:rPr lang="en-US" smtClean="0"/>
+              <a:t>Sizing</a:t>
+            </a:r>
+          </a:p>
+          <a:p>
+            <a:r>
+              <a:rPr lang="en-US"/>
+              <a:t>Design Artifacts/ Source Code Analysis</a:t>
+            </a:r>
+          </a:p>
+          <a:p>
+            <a:pPr lvl="1"/>
+            <a:r>
+              <a:rPr lang="en-US" sz="2000"/>
+              <a:t>User stories, Use cases, Design artifact</a:t>
+            </a:r>
+          </a:p>
+          <a:p>
+            <a:pPr lvl="1"/>
+            <a:r>
+              <a:rPr lang="en-US"/>
+              <a:t>Architecture recovery – components, transactions, </a:t>
+            </a:r>
+            <a:r>
+              <a:rPr lang="en-US"/>
+              <a:t>data </a:t>
+            </a:r>
+            <a:r>
+              <a:rPr lang="en-US" smtClean="0"/>
+              <a:t>elements</a:t>
+            </a:r>
+            <a:r>
+              <a:rPr lang="en-US"/>
+              <a:t>.</a:t>
+            </a:r>
+            <a:endParaRPr lang="en-US" smtClean="0"/>
+          </a:p>
+          <a:p>
+            <a:pPr lvl="1"/>
+            <a:r>
+              <a:rPr lang="en-US" smtClean="0"/>
+              <a:t>Functional Size</a:t>
+            </a:r>
+          </a:p>
+          <a:p>
+            <a:pPr lvl="2"/>
+            <a:r>
+              <a:rPr lang="en-US" smtClean="0"/>
+              <a:t>Automated </a:t>
+            </a:r>
+            <a:r>
+              <a:rPr lang="en-US" smtClean="0"/>
+              <a:t>transaction identification and classification</a:t>
+            </a:r>
+          </a:p>
+          <a:p>
+            <a:pPr lvl="1"/>
+            <a:r>
+              <a:rPr lang="en-US" smtClean="0"/>
+              <a:t>50+ design and code metrics</a:t>
+            </a:r>
+          </a:p>
+          <a:p>
+            <a:r>
+              <a:rPr lang="en-US" smtClean="0"/>
+              <a:t>Incremental Effort Estimation</a:t>
+            </a:r>
+          </a:p>
+          <a:p>
+            <a:pPr lvl="1"/>
+            <a:r>
+              <a:rPr lang="en-US"/>
+              <a:t>C</a:t>
+            </a:r>
+            <a:r>
+              <a:rPr lang="en-US" smtClean="0"/>
+              <a:t>ontinuous effort estimation over the process</a:t>
+            </a:r>
+            <a:endParaRPr lang="en-US"/>
+          </a:p>
+          <a:p>
+            <a:r>
+              <a:rPr lang="en-US" smtClean="0"/>
+              <a:t>Data-driven Software </a:t>
+            </a:r>
+            <a:r>
+              <a:rPr lang="en-US"/>
+              <a:t>Management</a:t>
+            </a:r>
+          </a:p>
+          <a:p>
+            <a:pPr lvl="1"/>
+            <a:r>
+              <a:rPr lang="en-US"/>
+              <a:t>Prioritization of development </a:t>
+            </a:r>
+            <a:r>
+              <a:rPr lang="en-US" smtClean="0"/>
+              <a:t>tasks</a:t>
+            </a:r>
+            <a:endParaRPr lang="en-US"/>
+          </a:p>
+          <a:p>
+            <a:pPr lvl="1"/>
+            <a:r>
+              <a:rPr lang="en-US"/>
+              <a:t>Resource </a:t>
+            </a:r>
+            <a:r>
+              <a:rPr lang="en-US" smtClean="0"/>
+              <a:t>allocation</a:t>
+            </a:r>
+            <a:endParaRPr lang="en-US"/>
+          </a:p>
+          <a:p>
+            <a:pPr lvl="1"/>
+            <a:r>
+              <a:rPr lang="en-US"/>
+              <a:t>Feasibility </a:t>
+            </a:r>
+            <a:r>
+              <a:rPr lang="en-US" smtClean="0"/>
+              <a:t>analysis</a:t>
+            </a:r>
+          </a:p>
+          <a:p>
+            <a:pPr lvl="1"/>
+            <a:r>
+              <a:rPr lang="en-US" smtClean="0"/>
+              <a:t>Productivity Measuing.</a:t>
+            </a:r>
+            <a:endParaRPr lang="en-US"/>
+          </a:p>
+        </p:txBody>
+      </p:sp>
+    </p:spTree>
+    <p:extLst>
+      <p:ext uri="{BB962C8B-B14F-4D97-AF65-F5344CB8AC3E}">
+        <p14:creationId xmlns:p14="http://schemas.microsoft.com/office/powerpoint/2010/main" val="2404874576"/>
+      </p:ext>
+    </p:extLst>
+  </p:cSld>
+  <p:clrMapOvr>
+    <a:masterClrMapping/>
+  </p:clrMapOvr>
+  <p:timing>
+    <p:tnLst>
+      <p:par>
+        <p:cTn id="1" dur="indefinite" restart="never" nodeType="tmRoot"/>
+      </p:par>
+    </p:tnLst>
+  </p:timing>
+</p:sld>
+</file>
+
+<file path=ppt/slides/slide4.xml><?xml version="1.0" encoding="utf-8"?>
+<p:sld xmlns:a="http://schemas.openxmlformats.org/drawingml/2006/main" xmlns:r="http://schemas.openxmlformats.org/officeDocument/2006/relationships" xmlns:p="http://schemas.openxmlformats.org/presentationml/2006/main">
+  <p:cSld>
+    <p:spTree>
+      <p:nvGrpSpPr>
+        <p:cNvPr id="1" name=""/>
+        <p:cNvGrpSpPr/>
+        <p:nvPr/>
+      </p:nvGrpSpPr>
+      <p:grpSpPr>
+        <a:xfrm>
+          <a:off x="0" y="0"/>
+          <a:ext cx="0" cy="0"/>
+          <a:chOff x="0" y="0"/>
+          <a:chExt cx="0" cy="0"/>
+        </a:xfrm>
+      </p:grpSpPr>
+      <p:sp>
+        <p:nvSpPr>
+          <p:cNvPr id="2" name="Title 1"/>
+          <p:cNvSpPr>
+            <a:spLocks noGrp="1"/>
+          </p:cNvSpPr>
+          <p:nvPr>
+            <p:ph type="title"/>
+          </p:nvPr>
+        </p:nvSpPr>
+        <p:spPr/>
+        <p:txBody>
+          <a:bodyPr/>
+          <a:lstStyle/>
+          <a:p>
+            <a:r>
+              <a:rPr lang="en-US" smtClean="0"/>
+              <a:t>Design Artifact Analysis</a:t>
+            </a:r>
+            <a:endParaRPr lang="en-US" dirty="0"/>
+          </a:p>
+        </p:txBody>
+      </p:sp>
+      <p:pic>
+        <p:nvPicPr>
+          <p:cNvPr id="4" name="Content Placeholder 3"/>
+          <p:cNvPicPr>
+            <a:picLocks noGrp="1" noChangeAspect="1"/>
+          </p:cNvPicPr>
+          <p:nvPr>
+            <p:ph idx="1"/>
+          </p:nvPr>
+        </p:nvPicPr>
+        <p:blipFill>
+          <a:blip r:embed="rId2">
+            <a:extLst>
+              <a:ext uri="{28A0092B-C50C-407E-A947-70E740481C1C}">
+                <a14:useLocalDpi xmlns:a14="http://schemas.microsoft.com/office/drawing/2010/main" val="0"/>
+              </a:ext>
+            </a:extLst>
+          </a:blip>
+          <a:stretch>
+            <a:fillRect/>
+          </a:stretch>
+        </p:blipFill>
+        <p:spPr>
+          <a:xfrm>
+            <a:off x="1014937" y="1758266"/>
+            <a:ext cx="4829175" cy="3486150"/>
+          </a:xfrm>
+        </p:spPr>
+      </p:pic>
+      <p:sp>
+        <p:nvSpPr>
+          <p:cNvPr id="6" name="TextBox 5"/>
+          <p:cNvSpPr txBox="1"/>
+          <p:nvPr/>
+        </p:nvSpPr>
+        <p:spPr>
+          <a:xfrm>
+            <a:off x="6259946" y="1690688"/>
+            <a:ext cx="4621040" cy="2585323"/>
+          </a:xfrm>
+          <a:prstGeom prst="rect">
+            <a:avLst/>
+          </a:prstGeom>
+          <a:noFill/>
+        </p:spPr>
+        <p:txBody>
+          <a:bodyPr wrap="square" rtlCol="0">
+            <a:spAutoFit/>
+          </a:bodyPr>
+          <a:lstStyle/>
+          <a:p>
+            <a:pPr marL="342900" indent="-342900">
+              <a:buAutoNum type="arabicPeriod"/>
+            </a:pPr>
+            <a:r>
+              <a:rPr lang="en-US" smtClean="0"/>
+              <a:t>Briding modeling platforms with our Analysis tool.</a:t>
+            </a:r>
+          </a:p>
+          <a:p>
+            <a:pPr marL="342900" indent="-342900">
+              <a:buAutoNum type="arabicPeriod"/>
+            </a:pPr>
+            <a:r>
+              <a:rPr lang="en-US" smtClean="0"/>
+              <a:t>Unitform data structure for indexing, connecting, and organizing design objects using USIM.</a:t>
+            </a:r>
+          </a:p>
+          <a:p>
+            <a:pPr marL="342900" indent="-342900">
+              <a:buAutoNum type="arabicPeriod"/>
+            </a:pPr>
+            <a:r>
+              <a:rPr lang="en-US" smtClean="0"/>
+              <a:t>Automated transaction identification</a:t>
+            </a:r>
+            <a:r>
+              <a:rPr lang="en-US"/>
+              <a:t> </a:t>
+            </a:r>
+            <a:r>
+              <a:rPr lang="en-US" smtClean="0"/>
+              <a:t>and classifications.</a:t>
+            </a:r>
+          </a:p>
+          <a:p>
+            <a:pPr marL="342900" indent="-342900">
+              <a:buAutoNum type="arabicPeriod"/>
+            </a:pPr>
+            <a:r>
+              <a:rPr lang="en-US" smtClean="0"/>
+              <a:t>Design metrics calculation.</a:t>
+            </a:r>
+          </a:p>
+          <a:p>
+            <a:pPr marL="342900" indent="-342900">
+              <a:buAutoNum type="arabicPeriod"/>
+            </a:pPr>
+            <a:r>
+              <a:rPr lang="en-US" smtClean="0"/>
+              <a:t>Data profiling.</a:t>
+            </a:r>
+            <a:endParaRPr lang="en-US" smtClean="0"/>
+          </a:p>
+        </p:txBody>
+      </p:sp>
+    </p:spTree>
+    <p:extLst>
+      <p:ext uri="{BB962C8B-B14F-4D97-AF65-F5344CB8AC3E}">
+        <p14:creationId xmlns:p14="http://schemas.microsoft.com/office/powerpoint/2010/main" val="1319295671"/>
+      </p:ext>
+    </p:extLst>
+  </p:cSld>
+  <p:clrMapOvr>
+    <a:masterClrMapping/>
+  </p:clrMapOvr>
+  <p:timing>
+    <p:tnLst>
+      <p:par>
+        <p:cTn id="1" dur="indefinite" restart="never" nodeType="tmRoot"/>
+      </p:par>
+    </p:tnLst>
+  </p:timing>
+</p:sld>
+</file>
+
+<file path=ppt/slides/slide5.xml><?xml version="1.0" encoding="utf-8"?>
+<p:sld xmlns:a="http://schemas.openxmlformats.org/drawingml/2006/main" xmlns:r="http://schemas.openxmlformats.org/officeDocument/2006/relationships" xmlns:p="http://schemas.openxmlformats.org/presentationml/2006/main">
+  <p:cSld>
+    <p:spTree>
+      <p:nvGrpSpPr>
+        <p:cNvPr id="1" name=""/>
+        <p:cNvGrpSpPr/>
+        <p:nvPr/>
+      </p:nvGrpSpPr>
+      <p:grpSpPr>
+        <a:xfrm>
+          <a:off x="0" y="0"/>
+          <a:ext cx="0" cy="0"/>
+          <a:chOff x="0" y="0"/>
+          <a:chExt cx="0" cy="0"/>
+        </a:xfrm>
+      </p:grpSpPr>
+      <p:pic>
+        <p:nvPicPr>
+          <p:cNvPr id="8" name="Content Placeholder 3"/>
           <p:cNvPicPr>
             <a:picLocks noGrp="1" noChangeAspect="1"/>
           </p:cNvPicPr>
@@ -3924,7 +4884,7 @@
         </p:blipFill>
         <p:spPr>
           <a:xfrm>
-            <a:off x="838200" y="2257075"/>
+            <a:off x="838200" y="2857439"/>
             <a:ext cx="10515600" cy="3488438"/>
           </a:xfrm>
           <a:prstGeom prst="rect">
@@ -3932,20 +4892,164 @@
           </a:prstGeom>
         </p:spPr>
       </p:pic>
+      <p:sp>
+        <p:nvSpPr>
+          <p:cNvPr id="2" name="Title 1"/>
+          <p:cNvSpPr>
+            <a:spLocks noGrp="1"/>
+          </p:cNvSpPr>
+          <p:nvPr>
+            <p:ph type="title"/>
+          </p:nvPr>
+        </p:nvSpPr>
+        <p:spPr/>
+        <p:txBody>
+          <a:bodyPr/>
+          <a:lstStyle/>
+          <a:p>
+            <a:r>
+              <a:rPr lang="en-US" smtClean="0"/>
+              <a:t>Source Code Analysis</a:t>
+            </a:r>
+            <a:r>
+              <a:rPr lang="en-US" smtClean="0"/>
+              <a:t> </a:t>
+            </a:r>
+            <a:endParaRPr lang="en-US" dirty="0"/>
+          </a:p>
+        </p:txBody>
+      </p:sp>
+      <p:sp>
+        <p:nvSpPr>
+          <p:cNvPr id="7" name="TextBox 6"/>
+          <p:cNvSpPr txBox="1"/>
+          <p:nvPr/>
+        </p:nvSpPr>
+        <p:spPr>
+          <a:xfrm>
+            <a:off x="838201" y="1859866"/>
+            <a:ext cx="5193144" cy="1477328"/>
+          </a:xfrm>
+          <a:prstGeom prst="rect">
+            <a:avLst/>
+          </a:prstGeom>
+          <a:noFill/>
+        </p:spPr>
+        <p:txBody>
+          <a:bodyPr wrap="square" rtlCol="0">
+            <a:spAutoFit/>
+          </a:bodyPr>
+          <a:lstStyle/>
+          <a:p>
+            <a:pPr marL="342900" indent="-342900">
+              <a:buAutoNum type="arabicPeriod"/>
+            </a:pPr>
+            <a:r>
+              <a:rPr lang="en-US" smtClean="0"/>
+              <a:t>Source code analysis for low level graph representations.</a:t>
+            </a:r>
+          </a:p>
+          <a:p>
+            <a:pPr marL="342900" indent="-342900">
+              <a:buAutoNum type="arabicPeriod"/>
+            </a:pPr>
+            <a:r>
+              <a:rPr lang="en-US" smtClean="0"/>
+              <a:t>Component identification and control flow constructions.</a:t>
+            </a:r>
+          </a:p>
+          <a:p>
+            <a:pPr marL="342900" indent="-342900">
+              <a:buAutoNum type="arabicPeriod"/>
+            </a:pPr>
+            <a:r>
+              <a:rPr lang="en-US" smtClean="0"/>
+              <a:t>Automated software functional sizing.</a:t>
+            </a:r>
+          </a:p>
+        </p:txBody>
+      </p:sp>
     </p:spTree>
     <p:extLst>
       <p:ext uri="{BB962C8B-B14F-4D97-AF65-F5344CB8AC3E}">
-        <p14:creationId xmlns:p14="http://schemas.microsoft.com/office/powerpoint/2010/main" val="146592697"/>
+        <p14:creationId xmlns:p14="http://schemas.microsoft.com/office/powerpoint/2010/main" val="2160141603"/>
       </p:ext>
     </p:extLst>
   </p:cSld>
   <p:clrMapOvr>
     <a:masterClrMapping/>
   </p:clrMapOvr>
+  <p:timing>
+    <p:tnLst>
+      <p:par>
+        <p:cTn id="1" dur="indefinite" restart="never" nodeType="tmRoot"/>
+      </p:par>
+    </p:tnLst>
+  </p:timing>
 </p:sld>
 </file>
 
-<file path=ppt/slides/slide14.xml><?xml version="1.0" encoding="utf-8"?>
+<file path=ppt/slides/slide6.xml><?xml version="1.0" encoding="utf-8"?>
+<p:sld xmlns:a="http://schemas.openxmlformats.org/drawingml/2006/main" xmlns:r="http://schemas.openxmlformats.org/officeDocument/2006/relationships" xmlns:p="http://schemas.openxmlformats.org/presentationml/2006/main">
+  <p:cSld>
+    <p:spTree>
+      <p:nvGrpSpPr>
+        <p:cNvPr id="1" name=""/>
+        <p:cNvGrpSpPr/>
+        <p:nvPr/>
+      </p:nvGrpSpPr>
+      <p:grpSpPr>
+        <a:xfrm>
+          <a:off x="0" y="0"/>
+          <a:ext cx="0" cy="0"/>
+          <a:chOff x="0" y="0"/>
+          <a:chExt cx="0" cy="0"/>
+        </a:xfrm>
+      </p:grpSpPr>
+      <p:sp>
+        <p:nvSpPr>
+          <p:cNvPr id="2" name="Title 1"/>
+          <p:cNvSpPr>
+            <a:spLocks noGrp="1"/>
+          </p:cNvSpPr>
+          <p:nvPr>
+            <p:ph type="title"/>
+          </p:nvPr>
+        </p:nvSpPr>
+        <p:spPr/>
+        <p:txBody>
+          <a:bodyPr/>
+          <a:lstStyle/>
+          <a:p>
+            <a:r>
+              <a:rPr lang="en-US" smtClean="0"/>
+              <a:t>Design Metrics</a:t>
+            </a:r>
+            <a:endParaRPr lang="en-US" dirty="0"/>
+          </a:p>
+        </p:txBody>
+      </p:sp>
+    </p:spTree>
+    <p:extLst>
+      <p:ext uri="{BB962C8B-B14F-4D97-AF65-F5344CB8AC3E}">
+        <p14:creationId xmlns:p14="http://schemas.microsoft.com/office/powerpoint/2010/main" val="284580833"/>
+      </p:ext>
+    </p:extLst>
+  </p:cSld>
+  <p:clrMapOvr>
+    <a:masterClrMapping/>
+  </p:clrMapOvr>
+  <p:timing>
+    <p:tnLst>
+      <p:par>
+        <p:cTn id="1" dur="indefinite" restart="never" nodeType="tmRoot"/>
+      </p:par>
+    </p:tnLst>
+  </p:timing>
+</p:sld>
+</file>
+
+<file path=ppt/slides/slide7.xml><?xml version="1.0" encoding="utf-8"?>
 <p:sld xmlns:a="http://schemas.openxmlformats.org/drawingml/2006/main" xmlns:r="http://schemas.openxmlformats.org/officeDocument/2006/relationships" xmlns:p="http://schemas.openxmlformats.org/presentationml/2006/main">
   <p:cSld>
     <p:spTree>
@@ -4070,1629 +5174,6 @@
 </p:sld>
 </file>
 
-<file path=ppt/slides/slide15.xml><?xml version="1.0" encoding="utf-8"?>
-<p:sld xmlns:a="http://schemas.openxmlformats.org/drawingml/2006/main" xmlns:r="http://schemas.openxmlformats.org/officeDocument/2006/relationships" xmlns:p="http://schemas.openxmlformats.org/presentationml/2006/main">
-  <p:cSld>
-    <p:spTree>
-      <p:nvGrpSpPr>
-        <p:cNvPr id="1" name=""/>
-        <p:cNvGrpSpPr/>
-        <p:nvPr/>
-      </p:nvGrpSpPr>
-      <p:grpSpPr>
-        <a:xfrm>
-          <a:off x="0" y="0"/>
-          <a:ext cx="0" cy="0"/>
-          <a:chOff x="0" y="0"/>
-          <a:chExt cx="0" cy="0"/>
-        </a:xfrm>
-      </p:grpSpPr>
-      <p:sp>
-        <p:nvSpPr>
-          <p:cNvPr id="2" name="Title 1"/>
-          <p:cNvSpPr>
-            <a:spLocks noGrp="1"/>
-          </p:cNvSpPr>
-          <p:nvPr>
-            <p:ph type="title"/>
-          </p:nvPr>
-        </p:nvSpPr>
-        <p:spPr/>
-        <p:txBody>
-          <a:bodyPr/>
-          <a:lstStyle/>
-          <a:p>
-            <a:r>
-              <a:rPr lang="en-US" dirty="0" smtClean="0"/>
-              <a:t>Use Cases of the Derived Model Information</a:t>
-            </a:r>
-            <a:endParaRPr lang="en-US" dirty="0"/>
-          </a:p>
-        </p:txBody>
-      </p:sp>
-      <p:pic>
-        <p:nvPicPr>
-          <p:cNvPr id="4" name="Content Placeholder 3"/>
-          <p:cNvPicPr>
-            <a:picLocks noGrp="1" noChangeAspect="1"/>
-          </p:cNvPicPr>
-          <p:nvPr>
-            <p:ph idx="1"/>
-          </p:nvPr>
-        </p:nvPicPr>
-        <p:blipFill>
-          <a:blip r:embed="rId2">
-            <a:extLst>
-              <a:ext uri="{28A0092B-C50C-407E-A947-70E740481C1C}">
-                <a14:useLocalDpi xmlns:a14="http://schemas.microsoft.com/office/drawing/2010/main" val="0"/>
-              </a:ext>
-            </a:extLst>
-          </a:blip>
-          <a:stretch>
-            <a:fillRect/>
-          </a:stretch>
-        </p:blipFill>
-        <p:spPr>
-          <a:xfrm>
-            <a:off x="838200" y="1690688"/>
-            <a:ext cx="3304281" cy="4351338"/>
-          </a:xfrm>
-        </p:spPr>
-      </p:pic>
-      <p:pic>
-        <p:nvPicPr>
-          <p:cNvPr id="5" name="Picture 4"/>
-          <p:cNvPicPr>
-            <a:picLocks noChangeAspect="1"/>
-          </p:cNvPicPr>
-          <p:nvPr/>
-        </p:nvPicPr>
-        <p:blipFill>
-          <a:blip r:embed="rId3">
-            <a:extLst>
-              <a:ext uri="{28A0092B-C50C-407E-A947-70E740481C1C}">
-                <a14:useLocalDpi xmlns:a14="http://schemas.microsoft.com/office/drawing/2010/main" val="0"/>
-              </a:ext>
-            </a:extLst>
-          </a:blip>
-          <a:stretch>
-            <a:fillRect/>
-          </a:stretch>
-        </p:blipFill>
-        <p:spPr>
-          <a:xfrm>
-            <a:off x="4211115" y="1367626"/>
-            <a:ext cx="3769770" cy="2827328"/>
-          </a:xfrm>
-          <a:prstGeom prst="rect">
-            <a:avLst/>
-          </a:prstGeom>
-        </p:spPr>
-      </p:pic>
-      <p:pic>
-        <p:nvPicPr>
-          <p:cNvPr id="6" name="Picture 5"/>
-          <p:cNvPicPr>
-            <a:picLocks noChangeAspect="1"/>
-          </p:cNvPicPr>
-          <p:nvPr/>
-        </p:nvPicPr>
-        <p:blipFill>
-          <a:blip r:embed="rId4" cstate="print">
-            <a:extLst>
-              <a:ext uri="{28A0092B-C50C-407E-A947-70E740481C1C}">
-                <a14:useLocalDpi xmlns:a14="http://schemas.microsoft.com/office/drawing/2010/main" val="0"/>
-              </a:ext>
-            </a:extLst>
-          </a:blip>
-          <a:stretch>
-            <a:fillRect/>
-          </a:stretch>
-        </p:blipFill>
-        <p:spPr>
-          <a:xfrm>
-            <a:off x="4352067" y="2781290"/>
-            <a:ext cx="2800170" cy="3150191"/>
-          </a:xfrm>
-          <a:prstGeom prst="rect">
-            <a:avLst/>
-          </a:prstGeom>
-        </p:spPr>
-      </p:pic>
-      <p:pic>
-        <p:nvPicPr>
-          <p:cNvPr id="7" name="Picture 6"/>
-          <p:cNvPicPr>
-            <a:picLocks noChangeAspect="1"/>
-          </p:cNvPicPr>
-          <p:nvPr/>
-        </p:nvPicPr>
-        <p:blipFill>
-          <a:blip r:embed="rId5">
-            <a:extLst>
-              <a:ext uri="{28A0092B-C50C-407E-A947-70E740481C1C}">
-                <a14:useLocalDpi xmlns:a14="http://schemas.microsoft.com/office/drawing/2010/main" val="0"/>
-              </a:ext>
-            </a:extLst>
-          </a:blip>
-          <a:stretch>
-            <a:fillRect/>
-          </a:stretch>
-        </p:blipFill>
-        <p:spPr>
-          <a:xfrm>
-            <a:off x="7548179" y="1367626"/>
-            <a:ext cx="3946573" cy="2959930"/>
-          </a:xfrm>
-          <a:prstGeom prst="rect">
-            <a:avLst/>
-          </a:prstGeom>
-        </p:spPr>
-      </p:pic>
-      <p:pic>
-        <p:nvPicPr>
-          <p:cNvPr id="8" name="Picture 7"/>
-          <p:cNvPicPr>
-            <a:picLocks noChangeAspect="1"/>
-          </p:cNvPicPr>
-          <p:nvPr/>
-        </p:nvPicPr>
-        <p:blipFill>
-          <a:blip r:embed="rId6">
-            <a:extLst>
-              <a:ext uri="{28A0092B-C50C-407E-A947-70E740481C1C}">
-                <a14:useLocalDpi xmlns:a14="http://schemas.microsoft.com/office/drawing/2010/main" val="0"/>
-              </a:ext>
-            </a:extLst>
-          </a:blip>
-          <a:stretch>
-            <a:fillRect/>
-          </a:stretch>
-        </p:blipFill>
-        <p:spPr>
-          <a:xfrm>
-            <a:off x="6876234" y="4066516"/>
-            <a:ext cx="3468616" cy="2261877"/>
-          </a:xfrm>
-          <a:prstGeom prst="rect">
-            <a:avLst/>
-          </a:prstGeom>
-        </p:spPr>
-      </p:pic>
-    </p:spTree>
-    <p:extLst>
-      <p:ext uri="{BB962C8B-B14F-4D97-AF65-F5344CB8AC3E}">
-        <p14:creationId xmlns:p14="http://schemas.microsoft.com/office/powerpoint/2010/main" val="3064012165"/>
-      </p:ext>
-    </p:extLst>
-  </p:cSld>
-  <p:clrMapOvr>
-    <a:masterClrMapping/>
-  </p:clrMapOvr>
-  <p:timing>
-    <p:tnLst>
-      <p:par>
-        <p:cTn id="1" dur="indefinite" restart="never" nodeType="tmRoot"/>
-      </p:par>
-    </p:tnLst>
-  </p:timing>
-</p:sld>
-</file>
-
-<file path=ppt/slides/slide16.xml><?xml version="1.0" encoding="utf-8"?>
-<p:sld xmlns:a="http://schemas.openxmlformats.org/drawingml/2006/main" xmlns:r="http://schemas.openxmlformats.org/officeDocument/2006/relationships" xmlns:p="http://schemas.openxmlformats.org/presentationml/2006/main">
-  <p:cSld>
-    <p:spTree>
-      <p:nvGrpSpPr>
-        <p:cNvPr id="1" name=""/>
-        <p:cNvGrpSpPr/>
-        <p:nvPr/>
-      </p:nvGrpSpPr>
-      <p:grpSpPr>
-        <a:xfrm>
-          <a:off x="0" y="0"/>
-          <a:ext cx="0" cy="0"/>
-          <a:chOff x="0" y="0"/>
-          <a:chExt cx="0" cy="0"/>
-        </a:xfrm>
-      </p:grpSpPr>
-      <p:sp>
-        <p:nvSpPr>
-          <p:cNvPr id="2" name="Title 1"/>
-          <p:cNvSpPr>
-            <a:spLocks noGrp="1"/>
-          </p:cNvSpPr>
-          <p:nvPr>
-            <p:ph type="title"/>
-          </p:nvPr>
-        </p:nvSpPr>
-        <p:spPr/>
-        <p:txBody>
-          <a:bodyPr/>
-          <a:lstStyle/>
-          <a:p>
-            <a:r>
-              <a:rPr lang="en-US" dirty="0" smtClean="0"/>
-              <a:t>Tasks</a:t>
-            </a:r>
-            <a:endParaRPr lang="en-US" dirty="0"/>
-          </a:p>
-        </p:txBody>
-      </p:sp>
-      <p:sp>
-        <p:nvSpPr>
-          <p:cNvPr id="3" name="Content Placeholder 2"/>
-          <p:cNvSpPr>
-            <a:spLocks noGrp="1"/>
-          </p:cNvSpPr>
-          <p:nvPr>
-            <p:ph idx="1"/>
-          </p:nvPr>
-        </p:nvSpPr>
-        <p:spPr/>
-        <p:txBody>
-          <a:bodyPr/>
-          <a:lstStyle/>
-          <a:p>
-            <a:r>
-              <a:rPr lang="en-US" dirty="0" smtClean="0"/>
-              <a:t>The code pieces, analytical scripts, data are not fully integrated.</a:t>
-            </a:r>
-          </a:p>
-          <a:p>
-            <a:r>
-              <a:rPr lang="en-US" dirty="0" smtClean="0"/>
-              <a:t>Better structure of the framework to streamline the data processing procedure.</a:t>
-            </a:r>
-          </a:p>
-          <a:p>
-            <a:r>
-              <a:rPr lang="en-US" dirty="0" smtClean="0"/>
-              <a:t>Better ways to visualize the data and models. Some visualizations are not fully integrated to the web page.</a:t>
-            </a:r>
-          </a:p>
-          <a:p>
-            <a:r>
-              <a:rPr lang="en-US" dirty="0" smtClean="0"/>
-              <a:t>Explore model calibration and evaluation models.</a:t>
-            </a:r>
-            <a:endParaRPr lang="en-US" dirty="0"/>
-          </a:p>
-        </p:txBody>
-      </p:sp>
-    </p:spTree>
-    <p:extLst>
-      <p:ext uri="{BB962C8B-B14F-4D97-AF65-F5344CB8AC3E}">
-        <p14:creationId xmlns:p14="http://schemas.microsoft.com/office/powerpoint/2010/main" val="2577662836"/>
-      </p:ext>
-    </p:extLst>
-  </p:cSld>
-  <p:clrMapOvr>
-    <a:masterClrMapping/>
-  </p:clrMapOvr>
-  <p:timing>
-    <p:tnLst>
-      <p:par>
-        <p:cTn id="1" dur="indefinite" restart="never" nodeType="tmRoot"/>
-      </p:par>
-    </p:tnLst>
-  </p:timing>
-</p:sld>
-</file>
-
-<file path=ppt/slides/slide17.xml><?xml version="1.0" encoding="utf-8"?>
-<p:sld xmlns:a="http://schemas.openxmlformats.org/drawingml/2006/main" xmlns:r="http://schemas.openxmlformats.org/officeDocument/2006/relationships" xmlns:p="http://schemas.openxmlformats.org/presentationml/2006/main">
-  <p:cSld>
-    <p:spTree>
-      <p:nvGrpSpPr>
-        <p:cNvPr id="1" name=""/>
-        <p:cNvGrpSpPr/>
-        <p:nvPr/>
-      </p:nvGrpSpPr>
-      <p:grpSpPr>
-        <a:xfrm>
-          <a:off x="0" y="0"/>
-          <a:ext cx="0" cy="0"/>
-          <a:chOff x="0" y="0"/>
-          <a:chExt cx="0" cy="0"/>
-        </a:xfrm>
-      </p:grpSpPr>
-      <p:sp>
-        <p:nvSpPr>
-          <p:cNvPr id="2" name="Title 1"/>
-          <p:cNvSpPr>
-            <a:spLocks noGrp="1"/>
-          </p:cNvSpPr>
-          <p:nvPr>
-            <p:ph type="title"/>
-          </p:nvPr>
-        </p:nvSpPr>
-        <p:spPr/>
-        <p:txBody>
-          <a:bodyPr/>
-          <a:lstStyle/>
-          <a:p>
-            <a:r>
-              <a:rPr lang="en-US" dirty="0" smtClean="0"/>
-              <a:t>Questions?</a:t>
-            </a:r>
-            <a:endParaRPr lang="en-US" dirty="0"/>
-          </a:p>
-        </p:txBody>
-      </p:sp>
-    </p:spTree>
-    <p:extLst>
-      <p:ext uri="{BB962C8B-B14F-4D97-AF65-F5344CB8AC3E}">
-        <p14:creationId xmlns:p14="http://schemas.microsoft.com/office/powerpoint/2010/main" val="2432225347"/>
-      </p:ext>
-    </p:extLst>
-  </p:cSld>
-  <p:clrMapOvr>
-    <a:masterClrMapping/>
-  </p:clrMapOvr>
-  <p:timing>
-    <p:tnLst>
-      <p:par>
-        <p:cTn id="1" dur="indefinite" restart="never" nodeType="tmRoot"/>
-      </p:par>
-    </p:tnLst>
-  </p:timing>
-</p:sld>
-</file>
-
-<file path=ppt/slides/slide18.xml><?xml version="1.0" encoding="utf-8"?>
-<p:sld xmlns:a="http://schemas.openxmlformats.org/drawingml/2006/main" xmlns:r="http://schemas.openxmlformats.org/officeDocument/2006/relationships" xmlns:p="http://schemas.openxmlformats.org/presentationml/2006/main">
-  <p:cSld>
-    <p:spTree>
-      <p:nvGrpSpPr>
-        <p:cNvPr id="1" name=""/>
-        <p:cNvGrpSpPr/>
-        <p:nvPr/>
-      </p:nvGrpSpPr>
-      <p:grpSpPr>
-        <a:xfrm>
-          <a:off x="0" y="0"/>
-          <a:ext cx="0" cy="0"/>
-          <a:chOff x="0" y="0"/>
-          <a:chExt cx="0" cy="0"/>
-        </a:xfrm>
-      </p:grpSpPr>
-      <p:sp>
-        <p:nvSpPr>
-          <p:cNvPr id="2" name="Title 1"/>
-          <p:cNvSpPr>
-            <a:spLocks noGrp="1"/>
-          </p:cNvSpPr>
-          <p:nvPr>
-            <p:ph type="title"/>
-          </p:nvPr>
-        </p:nvSpPr>
-        <p:spPr/>
-        <p:txBody>
-          <a:bodyPr/>
-          <a:lstStyle/>
-          <a:p>
-            <a:r>
-              <a:rPr lang="en-US" dirty="0" smtClean="0"/>
-              <a:t>Screenshots</a:t>
-            </a:r>
-            <a:endParaRPr lang="en-US" dirty="0"/>
-          </a:p>
-        </p:txBody>
-      </p:sp>
-      <p:pic>
-        <p:nvPicPr>
-          <p:cNvPr id="4" name="Content Placeholder 3"/>
-          <p:cNvPicPr>
-            <a:picLocks noGrp="1" noChangeAspect="1"/>
-          </p:cNvPicPr>
-          <p:nvPr>
-            <p:ph idx="1"/>
-          </p:nvPr>
-        </p:nvPicPr>
-        <p:blipFill>
-          <a:blip r:embed="rId2">
-            <a:extLst>
-              <a:ext uri="{28A0092B-C50C-407E-A947-70E740481C1C}">
-                <a14:useLocalDpi xmlns:a14="http://schemas.microsoft.com/office/drawing/2010/main" val="0"/>
-              </a:ext>
-            </a:extLst>
-          </a:blip>
-          <a:stretch>
-            <a:fillRect/>
-          </a:stretch>
-        </p:blipFill>
-        <p:spPr>
-          <a:xfrm>
-            <a:off x="2079380" y="1825625"/>
-            <a:ext cx="8033239" cy="4351338"/>
-          </a:xfrm>
-        </p:spPr>
-      </p:pic>
-    </p:spTree>
-    <p:extLst>
-      <p:ext uri="{BB962C8B-B14F-4D97-AF65-F5344CB8AC3E}">
-        <p14:creationId xmlns:p14="http://schemas.microsoft.com/office/powerpoint/2010/main" val="304617625"/>
-      </p:ext>
-    </p:extLst>
-  </p:cSld>
-  <p:clrMapOvr>
-    <a:masterClrMapping/>
-  </p:clrMapOvr>
-  <p:timing>
-    <p:tnLst>
-      <p:par>
-        <p:cTn id="1" dur="indefinite" restart="never" nodeType="tmRoot"/>
-      </p:par>
-    </p:tnLst>
-  </p:timing>
-</p:sld>
-</file>
-
-<file path=ppt/slides/slide19.xml><?xml version="1.0" encoding="utf-8"?>
-<p:sld xmlns:a="http://schemas.openxmlformats.org/drawingml/2006/main" xmlns:r="http://schemas.openxmlformats.org/officeDocument/2006/relationships" xmlns:p="http://schemas.openxmlformats.org/presentationml/2006/main">
-  <p:cSld>
-    <p:spTree>
-      <p:nvGrpSpPr>
-        <p:cNvPr id="1" name=""/>
-        <p:cNvGrpSpPr/>
-        <p:nvPr/>
-      </p:nvGrpSpPr>
-      <p:grpSpPr>
-        <a:xfrm>
-          <a:off x="0" y="0"/>
-          <a:ext cx="0" cy="0"/>
-          <a:chOff x="0" y="0"/>
-          <a:chExt cx="0" cy="0"/>
-        </a:xfrm>
-      </p:grpSpPr>
-      <p:sp>
-        <p:nvSpPr>
-          <p:cNvPr id="2" name="Title 1"/>
-          <p:cNvSpPr>
-            <a:spLocks noGrp="1"/>
-          </p:cNvSpPr>
-          <p:nvPr>
-            <p:ph type="title"/>
-          </p:nvPr>
-        </p:nvSpPr>
-        <p:spPr/>
-        <p:txBody>
-          <a:bodyPr/>
-          <a:lstStyle/>
-          <a:p>
-            <a:r>
-              <a:rPr lang="en-US" dirty="0" smtClean="0"/>
-              <a:t>Screenshots</a:t>
-            </a:r>
-            <a:endParaRPr lang="en-US" dirty="0"/>
-          </a:p>
-        </p:txBody>
-      </p:sp>
-      <p:pic>
-        <p:nvPicPr>
-          <p:cNvPr id="5" name="Content Placeholder 4"/>
-          <p:cNvPicPr>
-            <a:picLocks noGrp="1" noChangeAspect="1"/>
-          </p:cNvPicPr>
-          <p:nvPr>
-            <p:ph idx="1"/>
-          </p:nvPr>
-        </p:nvPicPr>
-        <p:blipFill>
-          <a:blip r:embed="rId2">
-            <a:extLst>
-              <a:ext uri="{28A0092B-C50C-407E-A947-70E740481C1C}">
-                <a14:useLocalDpi xmlns:a14="http://schemas.microsoft.com/office/drawing/2010/main" val="0"/>
-              </a:ext>
-            </a:extLst>
-          </a:blip>
-          <a:stretch>
-            <a:fillRect/>
-          </a:stretch>
-        </p:blipFill>
-        <p:spPr>
-          <a:xfrm>
-            <a:off x="2079380" y="1825625"/>
-            <a:ext cx="8033239" cy="4351338"/>
-          </a:xfrm>
-        </p:spPr>
-      </p:pic>
-    </p:spTree>
-    <p:extLst>
-      <p:ext uri="{BB962C8B-B14F-4D97-AF65-F5344CB8AC3E}">
-        <p14:creationId xmlns:p14="http://schemas.microsoft.com/office/powerpoint/2010/main" val="1660463960"/>
-      </p:ext>
-    </p:extLst>
-  </p:cSld>
-  <p:clrMapOvr>
-    <a:masterClrMapping/>
-  </p:clrMapOvr>
-  <p:timing>
-    <p:tnLst>
-      <p:par>
-        <p:cTn id="1" dur="indefinite" restart="never" nodeType="tmRoot"/>
-      </p:par>
-    </p:tnLst>
-  </p:timing>
-</p:sld>
-</file>
-
-<file path=ppt/slides/slide2.xml><?xml version="1.0" encoding="utf-8"?>
-<p:sld xmlns:a="http://schemas.openxmlformats.org/drawingml/2006/main" xmlns:r="http://schemas.openxmlformats.org/officeDocument/2006/relationships" xmlns:p="http://schemas.openxmlformats.org/presentationml/2006/main">
-  <p:cSld>
-    <p:spTree>
-      <p:nvGrpSpPr>
-        <p:cNvPr id="1" name=""/>
-        <p:cNvGrpSpPr/>
-        <p:nvPr/>
-      </p:nvGrpSpPr>
-      <p:grpSpPr>
-        <a:xfrm>
-          <a:off x="0" y="0"/>
-          <a:ext cx="0" cy="0"/>
-          <a:chOff x="0" y="0"/>
-          <a:chExt cx="0" cy="0"/>
-        </a:xfrm>
-      </p:grpSpPr>
-      <p:sp>
-        <p:nvSpPr>
-          <p:cNvPr id="2" name="Title 1"/>
-          <p:cNvSpPr>
-            <a:spLocks noGrp="1"/>
-          </p:cNvSpPr>
-          <p:nvPr>
-            <p:ph type="title"/>
-          </p:nvPr>
-        </p:nvSpPr>
-        <p:spPr/>
-        <p:txBody>
-          <a:bodyPr/>
-          <a:lstStyle/>
-          <a:p>
-            <a:r>
-              <a:rPr lang="en-US" dirty="0" smtClean="0"/>
-              <a:t>Purposes</a:t>
-            </a:r>
-            <a:endParaRPr lang="en-US" dirty="0"/>
-          </a:p>
-        </p:txBody>
-      </p:sp>
-      <p:sp>
-        <p:nvSpPr>
-          <p:cNvPr id="3" name="Content Placeholder 2"/>
-          <p:cNvSpPr>
-            <a:spLocks noGrp="1"/>
-          </p:cNvSpPr>
-          <p:nvPr>
-            <p:ph idx="1"/>
-          </p:nvPr>
-        </p:nvSpPr>
-        <p:spPr/>
-        <p:txBody>
-          <a:bodyPr/>
-          <a:lstStyle/>
-          <a:p>
-            <a:r>
-              <a:rPr lang="en-US" dirty="0" smtClean="0"/>
-              <a:t>Work as data mining platform to extract useful information that can facilitate decision making in software engineering.</a:t>
-            </a:r>
-          </a:p>
-          <a:p>
-            <a:pPr lvl="1"/>
-            <a:r>
-              <a:rPr lang="en-US" dirty="0" smtClean="0"/>
-              <a:t>Software size metrics for scope management, resource allocation, etc.</a:t>
-            </a:r>
-          </a:p>
-          <a:p>
-            <a:pPr lvl="1"/>
-            <a:r>
-              <a:rPr lang="en-US" dirty="0" smtClean="0"/>
-              <a:t>Effort estimation for planning, risk mitigation, task assignment, etc.</a:t>
-            </a:r>
-          </a:p>
-          <a:p>
-            <a:pPr lvl="1"/>
-            <a:r>
-              <a:rPr lang="en-US" dirty="0" smtClean="0"/>
-              <a:t>Software understanding for testing, maintenance, and architecture, etc.</a:t>
-            </a:r>
-          </a:p>
-        </p:txBody>
-      </p:sp>
-    </p:spTree>
-    <p:extLst>
-      <p:ext uri="{BB962C8B-B14F-4D97-AF65-F5344CB8AC3E}">
-        <p14:creationId xmlns:p14="http://schemas.microsoft.com/office/powerpoint/2010/main" val="1918546338"/>
-      </p:ext>
-    </p:extLst>
-  </p:cSld>
-  <p:clrMapOvr>
-    <a:masterClrMapping/>
-  </p:clrMapOvr>
-  <p:timing>
-    <p:tnLst>
-      <p:par>
-        <p:cTn id="1" dur="indefinite" restart="never" nodeType="tmRoot"/>
-      </p:par>
-    </p:tnLst>
-  </p:timing>
-</p:sld>
-</file>
-
-<file path=ppt/slides/slide20.xml><?xml version="1.0" encoding="utf-8"?>
-<p:sld xmlns:a="http://schemas.openxmlformats.org/drawingml/2006/main" xmlns:r="http://schemas.openxmlformats.org/officeDocument/2006/relationships" xmlns:p="http://schemas.openxmlformats.org/presentationml/2006/main">
-  <p:cSld>
-    <p:spTree>
-      <p:nvGrpSpPr>
-        <p:cNvPr id="1" name=""/>
-        <p:cNvGrpSpPr/>
-        <p:nvPr/>
-      </p:nvGrpSpPr>
-      <p:grpSpPr>
-        <a:xfrm>
-          <a:off x="0" y="0"/>
-          <a:ext cx="0" cy="0"/>
-          <a:chOff x="0" y="0"/>
-          <a:chExt cx="0" cy="0"/>
-        </a:xfrm>
-      </p:grpSpPr>
-      <p:sp>
-        <p:nvSpPr>
-          <p:cNvPr id="2" name="Title 1"/>
-          <p:cNvSpPr>
-            <a:spLocks noGrp="1"/>
-          </p:cNvSpPr>
-          <p:nvPr>
-            <p:ph type="title"/>
-          </p:nvPr>
-        </p:nvSpPr>
-        <p:spPr/>
-        <p:txBody>
-          <a:bodyPr/>
-          <a:lstStyle/>
-          <a:p>
-            <a:r>
-              <a:rPr lang="en-US" dirty="0" smtClean="0"/>
-              <a:t>Screenshots</a:t>
-            </a:r>
-            <a:endParaRPr lang="en-US" dirty="0"/>
-          </a:p>
-        </p:txBody>
-      </p:sp>
-      <p:pic>
-        <p:nvPicPr>
-          <p:cNvPr id="5" name="Content Placeholder 4"/>
-          <p:cNvPicPr>
-            <a:picLocks noGrp="1" noChangeAspect="1"/>
-          </p:cNvPicPr>
-          <p:nvPr>
-            <p:ph idx="1"/>
-          </p:nvPr>
-        </p:nvPicPr>
-        <p:blipFill>
-          <a:blip r:embed="rId2">
-            <a:extLst>
-              <a:ext uri="{28A0092B-C50C-407E-A947-70E740481C1C}">
-                <a14:useLocalDpi xmlns:a14="http://schemas.microsoft.com/office/drawing/2010/main" val="0"/>
-              </a:ext>
-            </a:extLst>
-          </a:blip>
-          <a:stretch>
-            <a:fillRect/>
-          </a:stretch>
-        </p:blipFill>
-        <p:spPr>
-          <a:xfrm>
-            <a:off x="2079380" y="1825625"/>
-            <a:ext cx="8033239" cy="4351338"/>
-          </a:xfrm>
-        </p:spPr>
-      </p:pic>
-    </p:spTree>
-    <p:extLst>
-      <p:ext uri="{BB962C8B-B14F-4D97-AF65-F5344CB8AC3E}">
-        <p14:creationId xmlns:p14="http://schemas.microsoft.com/office/powerpoint/2010/main" val="2918428292"/>
-      </p:ext>
-    </p:extLst>
-  </p:cSld>
-  <p:clrMapOvr>
-    <a:masterClrMapping/>
-  </p:clrMapOvr>
-  <p:timing>
-    <p:tnLst>
-      <p:par>
-        <p:cTn id="1" dur="indefinite" restart="never" nodeType="tmRoot"/>
-      </p:par>
-    </p:tnLst>
-  </p:timing>
-</p:sld>
-</file>
-
-<file path=ppt/slides/slide21.xml><?xml version="1.0" encoding="utf-8"?>
-<p:sld xmlns:a="http://schemas.openxmlformats.org/drawingml/2006/main" xmlns:r="http://schemas.openxmlformats.org/officeDocument/2006/relationships" xmlns:p="http://schemas.openxmlformats.org/presentationml/2006/main">
-  <p:cSld>
-    <p:spTree>
-      <p:nvGrpSpPr>
-        <p:cNvPr id="1" name=""/>
-        <p:cNvGrpSpPr/>
-        <p:nvPr/>
-      </p:nvGrpSpPr>
-      <p:grpSpPr>
-        <a:xfrm>
-          <a:off x="0" y="0"/>
-          <a:ext cx="0" cy="0"/>
-          <a:chOff x="0" y="0"/>
-          <a:chExt cx="0" cy="0"/>
-        </a:xfrm>
-      </p:grpSpPr>
-      <p:sp>
-        <p:nvSpPr>
-          <p:cNvPr id="2" name="Title 1"/>
-          <p:cNvSpPr>
-            <a:spLocks noGrp="1"/>
-          </p:cNvSpPr>
-          <p:nvPr>
-            <p:ph type="title"/>
-          </p:nvPr>
-        </p:nvSpPr>
-        <p:spPr/>
-        <p:txBody>
-          <a:bodyPr/>
-          <a:lstStyle/>
-          <a:p>
-            <a:r>
-              <a:rPr lang="en-US" dirty="0" smtClean="0"/>
-              <a:t>Screenshots</a:t>
-            </a:r>
-            <a:endParaRPr lang="en-US" dirty="0"/>
-          </a:p>
-        </p:txBody>
-      </p:sp>
-      <p:pic>
-        <p:nvPicPr>
-          <p:cNvPr id="5" name="Content Placeholder 4"/>
-          <p:cNvPicPr>
-            <a:picLocks noGrp="1" noChangeAspect="1"/>
-          </p:cNvPicPr>
-          <p:nvPr>
-            <p:ph idx="1"/>
-          </p:nvPr>
-        </p:nvPicPr>
-        <p:blipFill>
-          <a:blip r:embed="rId2">
-            <a:extLst>
-              <a:ext uri="{28A0092B-C50C-407E-A947-70E740481C1C}">
-                <a14:useLocalDpi xmlns:a14="http://schemas.microsoft.com/office/drawing/2010/main" val="0"/>
-              </a:ext>
-            </a:extLst>
-          </a:blip>
-          <a:stretch>
-            <a:fillRect/>
-          </a:stretch>
-        </p:blipFill>
-        <p:spPr>
-          <a:xfrm>
-            <a:off x="2079380" y="1825625"/>
-            <a:ext cx="8033239" cy="4351338"/>
-          </a:xfrm>
-        </p:spPr>
-      </p:pic>
-    </p:spTree>
-    <p:extLst>
-      <p:ext uri="{BB962C8B-B14F-4D97-AF65-F5344CB8AC3E}">
-        <p14:creationId xmlns:p14="http://schemas.microsoft.com/office/powerpoint/2010/main" val="1029340432"/>
-      </p:ext>
-    </p:extLst>
-  </p:cSld>
-  <p:clrMapOvr>
-    <a:masterClrMapping/>
-  </p:clrMapOvr>
-  <p:timing>
-    <p:tnLst>
-      <p:par>
-        <p:cTn id="1" dur="indefinite" restart="never" nodeType="tmRoot"/>
-      </p:par>
-    </p:tnLst>
-  </p:timing>
-</p:sld>
-</file>
-
-<file path=ppt/slides/slide22.xml><?xml version="1.0" encoding="utf-8"?>
-<p:sld xmlns:a="http://schemas.openxmlformats.org/drawingml/2006/main" xmlns:r="http://schemas.openxmlformats.org/officeDocument/2006/relationships" xmlns:p="http://schemas.openxmlformats.org/presentationml/2006/main">
-  <p:cSld>
-    <p:spTree>
-      <p:nvGrpSpPr>
-        <p:cNvPr id="1" name=""/>
-        <p:cNvGrpSpPr/>
-        <p:nvPr/>
-      </p:nvGrpSpPr>
-      <p:grpSpPr>
-        <a:xfrm>
-          <a:off x="0" y="0"/>
-          <a:ext cx="0" cy="0"/>
-          <a:chOff x="0" y="0"/>
-          <a:chExt cx="0" cy="0"/>
-        </a:xfrm>
-      </p:grpSpPr>
-      <p:sp>
-        <p:nvSpPr>
-          <p:cNvPr id="2" name="Title 1"/>
-          <p:cNvSpPr>
-            <a:spLocks noGrp="1"/>
-          </p:cNvSpPr>
-          <p:nvPr>
-            <p:ph type="title"/>
-          </p:nvPr>
-        </p:nvSpPr>
-        <p:spPr/>
-        <p:txBody>
-          <a:bodyPr/>
-          <a:lstStyle/>
-          <a:p>
-            <a:r>
-              <a:rPr lang="en-US" dirty="0" smtClean="0"/>
-              <a:t>Screenshots</a:t>
-            </a:r>
-            <a:endParaRPr lang="en-US" dirty="0"/>
-          </a:p>
-        </p:txBody>
-      </p:sp>
-      <p:pic>
-        <p:nvPicPr>
-          <p:cNvPr id="4" name="Content Placeholder 3"/>
-          <p:cNvPicPr>
-            <a:picLocks noGrp="1" noChangeAspect="1"/>
-          </p:cNvPicPr>
-          <p:nvPr>
-            <p:ph idx="1"/>
-          </p:nvPr>
-        </p:nvPicPr>
-        <p:blipFill>
-          <a:blip r:embed="rId2">
-            <a:extLst>
-              <a:ext uri="{28A0092B-C50C-407E-A947-70E740481C1C}">
-                <a14:useLocalDpi xmlns:a14="http://schemas.microsoft.com/office/drawing/2010/main" val="0"/>
-              </a:ext>
-            </a:extLst>
-          </a:blip>
-          <a:stretch>
-            <a:fillRect/>
-          </a:stretch>
-        </p:blipFill>
-        <p:spPr>
-          <a:xfrm>
-            <a:off x="2079380" y="1825625"/>
-            <a:ext cx="8033239" cy="4351338"/>
-          </a:xfrm>
-        </p:spPr>
-      </p:pic>
-    </p:spTree>
-    <p:extLst>
-      <p:ext uri="{BB962C8B-B14F-4D97-AF65-F5344CB8AC3E}">
-        <p14:creationId xmlns:p14="http://schemas.microsoft.com/office/powerpoint/2010/main" val="1729282589"/>
-      </p:ext>
-    </p:extLst>
-  </p:cSld>
-  <p:clrMapOvr>
-    <a:masterClrMapping/>
-  </p:clrMapOvr>
-  <p:timing>
-    <p:tnLst>
-      <p:par>
-        <p:cTn id="1" dur="indefinite" restart="never" nodeType="tmRoot"/>
-      </p:par>
-    </p:tnLst>
-  </p:timing>
-</p:sld>
-</file>
-
-<file path=ppt/slides/slide3.xml><?xml version="1.0" encoding="utf-8"?>
-<p:sld xmlns:a="http://schemas.openxmlformats.org/drawingml/2006/main" xmlns:r="http://schemas.openxmlformats.org/officeDocument/2006/relationships" xmlns:p="http://schemas.openxmlformats.org/presentationml/2006/main">
-  <p:cSld>
-    <p:spTree>
-      <p:nvGrpSpPr>
-        <p:cNvPr id="1" name=""/>
-        <p:cNvGrpSpPr/>
-        <p:nvPr/>
-      </p:nvGrpSpPr>
-      <p:grpSpPr>
-        <a:xfrm>
-          <a:off x="0" y="0"/>
-          <a:ext cx="0" cy="0"/>
-          <a:chOff x="0" y="0"/>
-          <a:chExt cx="0" cy="0"/>
-        </a:xfrm>
-      </p:grpSpPr>
-      <p:sp>
-        <p:nvSpPr>
-          <p:cNvPr id="2" name="Title 1"/>
-          <p:cNvSpPr>
-            <a:spLocks noGrp="1"/>
-          </p:cNvSpPr>
-          <p:nvPr>
-            <p:ph type="title"/>
-          </p:nvPr>
-        </p:nvSpPr>
-        <p:spPr/>
-        <p:txBody>
-          <a:bodyPr/>
-          <a:lstStyle/>
-          <a:p>
-            <a:r>
-              <a:rPr lang="en-US" dirty="0" smtClean="0"/>
-              <a:t>The approaches</a:t>
-            </a:r>
-            <a:endParaRPr lang="en-US" dirty="0"/>
-          </a:p>
-        </p:txBody>
-      </p:sp>
-      <p:sp>
-        <p:nvSpPr>
-          <p:cNvPr id="3" name="Content Placeholder 2"/>
-          <p:cNvSpPr>
-            <a:spLocks noGrp="1"/>
-          </p:cNvSpPr>
-          <p:nvPr>
-            <p:ph idx="1"/>
-          </p:nvPr>
-        </p:nvSpPr>
-        <p:spPr/>
-        <p:txBody>
-          <a:bodyPr>
-            <a:normAutofit fontScale="85000" lnSpcReduction="20000"/>
-          </a:bodyPr>
-          <a:lstStyle/>
-          <a:p>
-            <a:r>
-              <a:rPr lang="en-US" smtClean="0"/>
-              <a:t>Design Artifacts Analysis</a:t>
-            </a:r>
-            <a:endParaRPr lang="en-US" dirty="0" smtClean="0"/>
-          </a:p>
-          <a:p>
-            <a:pPr lvl="1"/>
-            <a:r>
-              <a:rPr lang="en-US" sz="2000" smtClean="0"/>
-              <a:t>User stories, Use cases, Design artifacts</a:t>
-            </a:r>
-            <a:endParaRPr lang="en-US" sz="2000" dirty="0"/>
-          </a:p>
-          <a:p>
-            <a:r>
-              <a:rPr lang="en-US" smtClean="0"/>
-              <a:t>Source Code Analysis</a:t>
-            </a:r>
-          </a:p>
-          <a:p>
-            <a:pPr lvl="1"/>
-            <a:r>
-              <a:rPr lang="en-US" smtClean="0"/>
-              <a:t>Architecture recovery – components, transactions, data elements.</a:t>
-            </a:r>
-            <a:endParaRPr lang="en-US"/>
-          </a:p>
-          <a:p>
-            <a:r>
-              <a:rPr lang="en-US" smtClean="0"/>
-              <a:t>Automated Software Sizing</a:t>
-            </a:r>
-          </a:p>
-          <a:p>
-            <a:pPr lvl="1"/>
-            <a:r>
-              <a:rPr lang="en-US" smtClean="0"/>
-              <a:t>Automated transaction identification and classification</a:t>
-            </a:r>
-          </a:p>
-          <a:p>
-            <a:pPr lvl="1"/>
-            <a:r>
-              <a:rPr lang="en-US" smtClean="0"/>
-              <a:t>50+ design and code metrics</a:t>
-            </a:r>
-          </a:p>
-          <a:p>
-            <a:r>
-              <a:rPr lang="en-US" smtClean="0"/>
-              <a:t>Incremental Effort Estimation</a:t>
-            </a:r>
-          </a:p>
-          <a:p>
-            <a:pPr lvl="1"/>
-            <a:r>
-              <a:rPr lang="en-US"/>
-              <a:t>C</a:t>
-            </a:r>
-            <a:r>
-              <a:rPr lang="en-US" smtClean="0"/>
-              <a:t>ontinuous effort estimation over the process</a:t>
-            </a:r>
-            <a:endParaRPr lang="en-US"/>
-          </a:p>
-          <a:p>
-            <a:r>
-              <a:rPr lang="en-US" smtClean="0"/>
-              <a:t>Data-driven </a:t>
-            </a:r>
-            <a:r>
-              <a:rPr lang="en-US" smtClean="0"/>
-              <a:t>Software </a:t>
-            </a:r>
-            <a:r>
-              <a:rPr lang="en-US"/>
-              <a:t>Management</a:t>
-            </a:r>
-          </a:p>
-          <a:p>
-            <a:pPr lvl="1"/>
-            <a:r>
-              <a:rPr lang="en-US"/>
-              <a:t>Prioritization of development </a:t>
-            </a:r>
-            <a:r>
-              <a:rPr lang="en-US" smtClean="0"/>
-              <a:t>tasks</a:t>
-            </a:r>
-            <a:endParaRPr lang="en-US"/>
-          </a:p>
-          <a:p>
-            <a:pPr lvl="1"/>
-            <a:r>
-              <a:rPr lang="en-US"/>
-              <a:t>Resource </a:t>
-            </a:r>
-            <a:r>
-              <a:rPr lang="en-US" smtClean="0"/>
-              <a:t>allocation</a:t>
-            </a:r>
-            <a:endParaRPr lang="en-US"/>
-          </a:p>
-          <a:p>
-            <a:pPr lvl="1"/>
-            <a:r>
-              <a:rPr lang="en-US"/>
-              <a:t>Feasibility </a:t>
-            </a:r>
-            <a:r>
-              <a:rPr lang="en-US" smtClean="0"/>
-              <a:t>analysis</a:t>
-            </a:r>
-          </a:p>
-          <a:p>
-            <a:pPr lvl="1"/>
-            <a:r>
-              <a:rPr lang="en-US" smtClean="0"/>
-              <a:t>Productivity Measuing.</a:t>
-            </a:r>
-            <a:endParaRPr lang="en-US"/>
-          </a:p>
-        </p:txBody>
-      </p:sp>
-    </p:spTree>
-    <p:extLst>
-      <p:ext uri="{BB962C8B-B14F-4D97-AF65-F5344CB8AC3E}">
-        <p14:creationId xmlns:p14="http://schemas.microsoft.com/office/powerpoint/2010/main" val="2404874576"/>
-      </p:ext>
-    </p:extLst>
-  </p:cSld>
-  <p:clrMapOvr>
-    <a:masterClrMapping/>
-  </p:clrMapOvr>
-  <p:timing>
-    <p:tnLst>
-      <p:par>
-        <p:cTn id="1" dur="indefinite" restart="never" nodeType="tmRoot"/>
-      </p:par>
-    </p:tnLst>
-  </p:timing>
-</p:sld>
-</file>
-
-<file path=ppt/slides/slide4.xml><?xml version="1.0" encoding="utf-8"?>
-<p:sld xmlns:a="http://schemas.openxmlformats.org/drawingml/2006/main" xmlns:r="http://schemas.openxmlformats.org/officeDocument/2006/relationships" xmlns:p="http://schemas.openxmlformats.org/presentationml/2006/main">
-  <p:cSld>
-    <p:spTree>
-      <p:nvGrpSpPr>
-        <p:cNvPr id="1" name=""/>
-        <p:cNvGrpSpPr/>
-        <p:nvPr/>
-      </p:nvGrpSpPr>
-      <p:grpSpPr>
-        <a:xfrm>
-          <a:off x="0" y="0"/>
-          <a:ext cx="0" cy="0"/>
-          <a:chOff x="0" y="0"/>
-          <a:chExt cx="0" cy="0"/>
-        </a:xfrm>
-      </p:grpSpPr>
-      <p:sp>
-        <p:nvSpPr>
-          <p:cNvPr id="2" name="Title 1"/>
-          <p:cNvSpPr>
-            <a:spLocks noGrp="1"/>
-          </p:cNvSpPr>
-          <p:nvPr>
-            <p:ph type="title"/>
-          </p:nvPr>
-        </p:nvSpPr>
-        <p:spPr/>
-        <p:txBody>
-          <a:bodyPr/>
-          <a:lstStyle/>
-          <a:p>
-            <a:r>
-              <a:rPr lang="en-US" dirty="0" smtClean="0"/>
-              <a:t>User-system interaction model </a:t>
-            </a:r>
-            <a:endParaRPr lang="en-US" dirty="0"/>
-          </a:p>
-        </p:txBody>
-      </p:sp>
-      <p:pic>
-        <p:nvPicPr>
-          <p:cNvPr id="4" name="Content Placeholder 3"/>
-          <p:cNvPicPr>
-            <a:picLocks noGrp="1" noChangeAspect="1"/>
-          </p:cNvPicPr>
-          <p:nvPr>
-            <p:ph idx="1"/>
-          </p:nvPr>
-        </p:nvPicPr>
-        <p:blipFill>
-          <a:blip r:embed="rId2">
-            <a:extLst>
-              <a:ext uri="{28A0092B-C50C-407E-A947-70E740481C1C}">
-                <a14:useLocalDpi xmlns:a14="http://schemas.microsoft.com/office/drawing/2010/main" val="0"/>
-              </a:ext>
-            </a:extLst>
-          </a:blip>
-          <a:stretch>
-            <a:fillRect/>
-          </a:stretch>
-        </p:blipFill>
-        <p:spPr>
-          <a:xfrm>
-            <a:off x="5827083" y="1859866"/>
-            <a:ext cx="4829175" cy="3486150"/>
-          </a:xfrm>
-        </p:spPr>
-      </p:pic>
-      <p:sp>
-        <p:nvSpPr>
-          <p:cNvPr id="6" name="TextBox 5"/>
-          <p:cNvSpPr txBox="1"/>
-          <p:nvPr/>
-        </p:nvSpPr>
-        <p:spPr>
-          <a:xfrm>
-            <a:off x="838201" y="1859866"/>
-            <a:ext cx="4621040" cy="923330"/>
-          </a:xfrm>
-          <a:prstGeom prst="rect">
-            <a:avLst/>
-          </a:prstGeom>
-          <a:noFill/>
-        </p:spPr>
-        <p:txBody>
-          <a:bodyPr wrap="square" rtlCol="0">
-            <a:spAutoFit/>
-          </a:bodyPr>
-          <a:lstStyle/>
-          <a:p>
-            <a:r>
-              <a:rPr lang="en-US" dirty="0" smtClean="0"/>
-              <a:t>1. XMI files are parsed into a hierarchy of UML elements that define the user-system interaction model.</a:t>
-            </a:r>
-            <a:endParaRPr lang="en-US" dirty="0"/>
-          </a:p>
-        </p:txBody>
-      </p:sp>
-    </p:spTree>
-    <p:extLst>
-      <p:ext uri="{BB962C8B-B14F-4D97-AF65-F5344CB8AC3E}">
-        <p14:creationId xmlns:p14="http://schemas.microsoft.com/office/powerpoint/2010/main" val="1319295671"/>
-      </p:ext>
-    </p:extLst>
-  </p:cSld>
-  <p:clrMapOvr>
-    <a:masterClrMapping/>
-  </p:clrMapOvr>
-  <p:timing>
-    <p:tnLst>
-      <p:par>
-        <p:cTn id="1" dur="indefinite" restart="never" nodeType="tmRoot"/>
-      </p:par>
-    </p:tnLst>
-  </p:timing>
-</p:sld>
-</file>
-
-<file path=ppt/slides/slide5.xml><?xml version="1.0" encoding="utf-8"?>
-<p:sld xmlns:a="http://schemas.openxmlformats.org/drawingml/2006/main" xmlns:r="http://schemas.openxmlformats.org/officeDocument/2006/relationships" xmlns:p="http://schemas.openxmlformats.org/presentationml/2006/main">
-  <p:cSld>
-    <p:spTree>
-      <p:nvGrpSpPr>
-        <p:cNvPr id="1" name=""/>
-        <p:cNvGrpSpPr/>
-        <p:nvPr/>
-      </p:nvGrpSpPr>
-      <p:grpSpPr>
-        <a:xfrm>
-          <a:off x="0" y="0"/>
-          <a:ext cx="0" cy="0"/>
-          <a:chOff x="0" y="0"/>
-          <a:chExt cx="0" cy="0"/>
-        </a:xfrm>
-      </p:grpSpPr>
-      <p:sp>
-        <p:nvSpPr>
-          <p:cNvPr id="2" name="Title 1"/>
-          <p:cNvSpPr>
-            <a:spLocks noGrp="1"/>
-          </p:cNvSpPr>
-          <p:nvPr>
-            <p:ph type="title"/>
-          </p:nvPr>
-        </p:nvSpPr>
-        <p:spPr/>
-        <p:txBody>
-          <a:bodyPr/>
-          <a:lstStyle/>
-          <a:p>
-            <a:r>
-              <a:rPr lang="en-US" dirty="0" smtClean="0"/>
-              <a:t>User-system interaction model </a:t>
-            </a:r>
-            <a:endParaRPr lang="en-US" dirty="0"/>
-          </a:p>
-        </p:txBody>
-      </p:sp>
-      <p:pic>
-        <p:nvPicPr>
-          <p:cNvPr id="6" name="Content Placeholder 5"/>
-          <p:cNvPicPr>
-            <a:picLocks noGrp="1" noChangeAspect="1"/>
-          </p:cNvPicPr>
-          <p:nvPr>
-            <p:ph idx="1"/>
-          </p:nvPr>
-        </p:nvPicPr>
-        <p:blipFill>
-          <a:blip r:embed="rId2">
-            <a:extLst>
-              <a:ext uri="{28A0092B-C50C-407E-A947-70E740481C1C}">
-                <a14:useLocalDpi xmlns:a14="http://schemas.microsoft.com/office/drawing/2010/main" val="0"/>
-              </a:ext>
-            </a:extLst>
-          </a:blip>
-          <a:stretch>
-            <a:fillRect/>
-          </a:stretch>
-        </p:blipFill>
-        <p:spPr>
-          <a:xfrm>
-            <a:off x="6055140" y="1690688"/>
-            <a:ext cx="5298660" cy="4351338"/>
-          </a:xfrm>
-        </p:spPr>
-      </p:pic>
-      <p:sp>
-        <p:nvSpPr>
-          <p:cNvPr id="7" name="TextBox 6"/>
-          <p:cNvSpPr txBox="1"/>
-          <p:nvPr/>
-        </p:nvSpPr>
-        <p:spPr>
-          <a:xfrm>
-            <a:off x="838201" y="1859866"/>
-            <a:ext cx="4621040" cy="646331"/>
-          </a:xfrm>
-          <a:prstGeom prst="rect">
-            <a:avLst/>
-          </a:prstGeom>
-          <a:noFill/>
-        </p:spPr>
-        <p:txBody>
-          <a:bodyPr wrap="square" rtlCol="0">
-            <a:spAutoFit/>
-          </a:bodyPr>
-          <a:lstStyle/>
-          <a:p>
-            <a:r>
-              <a:rPr lang="en-US" dirty="0" smtClean="0"/>
-              <a:t>1. UML diagrams are abstracted into control flow diagrams for graph traversing algorithms.</a:t>
-            </a:r>
-            <a:endParaRPr lang="en-US" dirty="0"/>
-          </a:p>
-        </p:txBody>
-      </p:sp>
-    </p:spTree>
-    <p:extLst>
-      <p:ext uri="{BB962C8B-B14F-4D97-AF65-F5344CB8AC3E}">
-        <p14:creationId xmlns:p14="http://schemas.microsoft.com/office/powerpoint/2010/main" val="2160141603"/>
-      </p:ext>
-    </p:extLst>
-  </p:cSld>
-  <p:clrMapOvr>
-    <a:masterClrMapping/>
-  </p:clrMapOvr>
-  <p:timing>
-    <p:tnLst>
-      <p:par>
-        <p:cTn id="1" dur="indefinite" restart="never" nodeType="tmRoot"/>
-      </p:par>
-    </p:tnLst>
-  </p:timing>
-</p:sld>
-</file>
-
-<file path=ppt/slides/slide6.xml><?xml version="1.0" encoding="utf-8"?>
-<p:sld xmlns:a="http://schemas.openxmlformats.org/drawingml/2006/main" xmlns:r="http://schemas.openxmlformats.org/officeDocument/2006/relationships" xmlns:p="http://schemas.openxmlformats.org/presentationml/2006/main">
-  <p:cSld>
-    <p:spTree>
-      <p:nvGrpSpPr>
-        <p:cNvPr id="1" name=""/>
-        <p:cNvGrpSpPr/>
-        <p:nvPr/>
-      </p:nvGrpSpPr>
-      <p:grpSpPr>
-        <a:xfrm>
-          <a:off x="0" y="0"/>
-          <a:ext cx="0" cy="0"/>
-          <a:chOff x="0" y="0"/>
-          <a:chExt cx="0" cy="0"/>
-        </a:xfrm>
-      </p:grpSpPr>
-      <p:sp>
-        <p:nvSpPr>
-          <p:cNvPr id="2" name="Title 1"/>
-          <p:cNvSpPr>
-            <a:spLocks noGrp="1"/>
-          </p:cNvSpPr>
-          <p:nvPr>
-            <p:ph type="title"/>
-          </p:nvPr>
-        </p:nvSpPr>
-        <p:spPr/>
-        <p:txBody>
-          <a:bodyPr/>
-          <a:lstStyle/>
-          <a:p>
-            <a:r>
-              <a:rPr lang="en-US" dirty="0" smtClean="0"/>
-              <a:t>Model Transformation Algorithms</a:t>
-            </a:r>
-            <a:endParaRPr lang="en-US" dirty="0"/>
-          </a:p>
-        </p:txBody>
-      </p:sp>
-      <p:pic>
-        <p:nvPicPr>
-          <p:cNvPr id="4" name="Content Placeholder 3"/>
-          <p:cNvPicPr>
-            <a:picLocks noGrp="1" noChangeAspect="1"/>
-          </p:cNvPicPr>
-          <p:nvPr>
-            <p:ph idx="1"/>
-          </p:nvPr>
-        </p:nvPicPr>
-        <p:blipFill>
-          <a:blip r:embed="rId2"/>
-          <a:stretch>
-            <a:fillRect/>
-          </a:stretch>
-        </p:blipFill>
-        <p:spPr>
-          <a:xfrm>
-            <a:off x="3514693" y="1524803"/>
-            <a:ext cx="2581307" cy="4476955"/>
-          </a:xfrm>
-          <a:prstGeom prst="rect">
-            <a:avLst/>
-          </a:prstGeom>
-        </p:spPr>
-      </p:pic>
-      <p:pic>
-        <p:nvPicPr>
-          <p:cNvPr id="6" name="Picture 5"/>
-          <p:cNvPicPr>
-            <a:picLocks noChangeAspect="1"/>
-          </p:cNvPicPr>
-          <p:nvPr/>
-        </p:nvPicPr>
-        <p:blipFill>
-          <a:blip r:embed="rId3"/>
-          <a:stretch>
-            <a:fillRect/>
-          </a:stretch>
-        </p:blipFill>
-        <p:spPr>
-          <a:xfrm>
-            <a:off x="5989716" y="1285390"/>
-            <a:ext cx="2749944" cy="4955782"/>
-          </a:xfrm>
-          <a:prstGeom prst="rect">
-            <a:avLst/>
-          </a:prstGeom>
-        </p:spPr>
-      </p:pic>
-      <p:pic>
-        <p:nvPicPr>
-          <p:cNvPr id="7" name="Picture 6"/>
-          <p:cNvPicPr>
-            <a:picLocks noChangeAspect="1"/>
-          </p:cNvPicPr>
-          <p:nvPr/>
-        </p:nvPicPr>
-        <p:blipFill>
-          <a:blip r:embed="rId4"/>
-          <a:stretch>
-            <a:fillRect/>
-          </a:stretch>
-        </p:blipFill>
-        <p:spPr>
-          <a:xfrm>
-            <a:off x="8316409" y="1602463"/>
-            <a:ext cx="3063294" cy="3770207"/>
-          </a:xfrm>
-          <a:prstGeom prst="rect">
-            <a:avLst/>
-          </a:prstGeom>
-        </p:spPr>
-      </p:pic>
-    </p:spTree>
-    <p:extLst>
-      <p:ext uri="{BB962C8B-B14F-4D97-AF65-F5344CB8AC3E}">
-        <p14:creationId xmlns:p14="http://schemas.microsoft.com/office/powerpoint/2010/main" val="284580833"/>
-      </p:ext>
-    </p:extLst>
-  </p:cSld>
-  <p:clrMapOvr>
-    <a:masterClrMapping/>
-  </p:clrMapOvr>
-  <p:timing>
-    <p:tnLst>
-      <p:par>
-        <p:cTn id="1" dur="indefinite" restart="never" nodeType="tmRoot"/>
-      </p:par>
-    </p:tnLst>
-  </p:timing>
-</p:sld>
-</file>
-
-<file path=ppt/slides/slide7.xml><?xml version="1.0" encoding="utf-8"?>
-<p:sld xmlns:a="http://schemas.openxmlformats.org/drawingml/2006/main" xmlns:r="http://schemas.openxmlformats.org/officeDocument/2006/relationships" xmlns:p="http://schemas.openxmlformats.org/presentationml/2006/main">
-  <p:cSld>
-    <p:spTree>
-      <p:nvGrpSpPr>
-        <p:cNvPr id="1" name=""/>
-        <p:cNvGrpSpPr/>
-        <p:nvPr/>
-      </p:nvGrpSpPr>
-      <p:grpSpPr>
-        <a:xfrm>
-          <a:off x="0" y="0"/>
-          <a:ext cx="0" cy="0"/>
-          <a:chOff x="0" y="0"/>
-          <a:chExt cx="0" cy="0"/>
-        </a:xfrm>
-      </p:grpSpPr>
-      <p:sp>
-        <p:nvSpPr>
-          <p:cNvPr id="2" name="Title 1"/>
-          <p:cNvSpPr>
-            <a:spLocks noGrp="1"/>
-          </p:cNvSpPr>
-          <p:nvPr>
-            <p:ph type="title"/>
-          </p:nvPr>
-        </p:nvSpPr>
-        <p:spPr/>
-        <p:txBody>
-          <a:bodyPr/>
-          <a:lstStyle/>
-          <a:p>
-            <a:r>
-              <a:rPr lang="en-US" dirty="0" smtClean="0"/>
-              <a:t>User-system interaction model </a:t>
-            </a:r>
-            <a:endParaRPr lang="en-US" dirty="0"/>
-          </a:p>
-        </p:txBody>
-      </p:sp>
-      <p:pic>
-        <p:nvPicPr>
-          <p:cNvPr id="4" name="Content Placeholder 3"/>
-          <p:cNvPicPr>
-            <a:picLocks noGrp="1" noChangeAspect="1"/>
-          </p:cNvPicPr>
-          <p:nvPr>
-            <p:ph idx="1"/>
-          </p:nvPr>
-        </p:nvPicPr>
-        <p:blipFill>
-          <a:blip r:embed="rId2">
-            <a:extLst>
-              <a:ext uri="{28A0092B-C50C-407E-A947-70E740481C1C}">
-                <a14:useLocalDpi xmlns:a14="http://schemas.microsoft.com/office/drawing/2010/main" val="0"/>
-              </a:ext>
-            </a:extLst>
-          </a:blip>
-          <a:stretch>
-            <a:fillRect/>
-          </a:stretch>
-        </p:blipFill>
-        <p:spPr>
-          <a:xfrm>
-            <a:off x="3672056" y="1419084"/>
-            <a:ext cx="7681744" cy="3071435"/>
-          </a:xfrm>
-        </p:spPr>
-      </p:pic>
-      <p:sp>
-        <p:nvSpPr>
-          <p:cNvPr id="5" name="TextBox 4"/>
-          <p:cNvSpPr txBox="1"/>
-          <p:nvPr/>
-        </p:nvSpPr>
-        <p:spPr>
-          <a:xfrm>
-            <a:off x="648078" y="1690688"/>
-            <a:ext cx="3023978" cy="1477328"/>
-          </a:xfrm>
-          <a:prstGeom prst="rect">
-            <a:avLst/>
-          </a:prstGeom>
-          <a:noFill/>
-        </p:spPr>
-        <p:txBody>
-          <a:bodyPr wrap="square" rtlCol="0">
-            <a:spAutoFit/>
-          </a:bodyPr>
-          <a:lstStyle/>
-          <a:p>
-            <a:pPr marL="342900" indent="-342900">
-              <a:buAutoNum type="arabicPeriod"/>
-            </a:pPr>
-            <a:r>
-              <a:rPr lang="en-US" dirty="0" smtClean="0"/>
-              <a:t>The rules to determine system boundaries, stimuli, components, etc.</a:t>
-            </a:r>
-          </a:p>
-          <a:p>
-            <a:pPr marL="342900" indent="-342900">
-              <a:buAutoNum type="arabicPeriod"/>
-            </a:pPr>
-            <a:r>
-              <a:rPr lang="en-US" dirty="0" smtClean="0"/>
-              <a:t>Elements are visualized by notations.</a:t>
-            </a:r>
-            <a:endParaRPr lang="en-US" dirty="0"/>
-          </a:p>
-        </p:txBody>
-      </p:sp>
-    </p:spTree>
-    <p:extLst>
-      <p:ext uri="{BB962C8B-B14F-4D97-AF65-F5344CB8AC3E}">
-        <p14:creationId xmlns:p14="http://schemas.microsoft.com/office/powerpoint/2010/main" val="3180299830"/>
-      </p:ext>
-    </p:extLst>
-  </p:cSld>
-  <p:clrMapOvr>
-    <a:masterClrMapping/>
-  </p:clrMapOvr>
-  <p:timing>
-    <p:tnLst>
-      <p:par>
-        <p:cTn id="1" dur="indefinite" restart="never" nodeType="tmRoot"/>
-      </p:par>
-    </p:tnLst>
-  </p:timing>
-</p:sld>
-</file>
-
 <file path=ppt/slides/slide8.xml><?xml version="1.0" encoding="utf-8"?>
 <p:sld xmlns:a="http://schemas.openxmlformats.org/drawingml/2006/main" xmlns:r="http://schemas.openxmlformats.org/officeDocument/2006/relationships" xmlns:p="http://schemas.openxmlformats.org/presentationml/2006/main">
   <p:cSld>
@@ -5726,91 +5207,93 @@
           <a:lstStyle/>
           <a:p>
             <a:r>
-              <a:rPr lang="en-US" dirty="0" smtClean="0"/>
-              <a:t>USIM Implementation Details</a:t>
+              <a:rPr lang="en-US" smtClean="0"/>
+              <a:t>Incremental Effort Estimation Model</a:t>
             </a:r>
             <a:endParaRPr lang="en-US" dirty="0"/>
           </a:p>
         </p:txBody>
       </p:sp>
-      <p:pic>
-        <p:nvPicPr>
-          <p:cNvPr id="4" name="Content Placeholder 3"/>
-          <p:cNvPicPr>
-            <a:picLocks noGrp="1" noChangeAspect="1"/>
-          </p:cNvPicPr>
-          <p:nvPr>
-            <p:ph idx="1"/>
-          </p:nvPr>
-        </p:nvPicPr>
-        <p:blipFill>
-          <a:blip r:embed="rId2"/>
-          <a:stretch>
-            <a:fillRect/>
-          </a:stretch>
-        </p:blipFill>
+      <p:sp>
+        <p:nvSpPr>
+          <p:cNvPr id="5" name="TextBox 4"/>
+          <p:cNvSpPr txBox="1"/>
+          <p:nvPr/>
+        </p:nvSpPr>
         <p:spPr>
           <a:xfrm>
-            <a:off x="731761" y="1526860"/>
-            <a:ext cx="2200114" cy="4351338"/>
+            <a:off x="648078" y="1690687"/>
+            <a:ext cx="4690540" cy="2862322"/>
           </a:xfrm>
           <a:prstGeom prst="rect">
             <a:avLst/>
           </a:prstGeom>
+          <a:noFill/>
         </p:spPr>
-      </p:pic>
-      <p:pic>
-        <p:nvPicPr>
-          <p:cNvPr id="5" name="Picture 4"/>
-          <p:cNvPicPr>
-            <a:picLocks noChangeAspect="1"/>
-          </p:cNvPicPr>
-          <p:nvPr/>
-        </p:nvPicPr>
-        <p:blipFill>
-          <a:blip r:embed="rId3"/>
-          <a:stretch>
-            <a:fillRect/>
-          </a:stretch>
-        </p:blipFill>
-        <p:spPr>
-          <a:xfrm>
-            <a:off x="2487729" y="1526860"/>
-            <a:ext cx="5682747" cy="2818803"/>
-          </a:xfrm>
-          <a:prstGeom prst="rect">
-            <a:avLst/>
-          </a:prstGeom>
-        </p:spPr>
-      </p:pic>
-      <p:pic>
-        <p:nvPicPr>
-          <p:cNvPr id="7" name="Picture 6"/>
-          <p:cNvPicPr>
-            <a:picLocks noChangeAspect="1"/>
-          </p:cNvPicPr>
-          <p:nvPr/>
-        </p:nvPicPr>
-        <p:blipFill>
-          <a:blip r:embed="rId4"/>
-          <a:stretch>
-            <a:fillRect/>
-          </a:stretch>
-        </p:blipFill>
-        <p:spPr>
-          <a:xfrm>
-            <a:off x="5558723" y="3564519"/>
-            <a:ext cx="5795077" cy="2313679"/>
-          </a:xfrm>
-          <a:prstGeom prst="rect">
-            <a:avLst/>
-          </a:prstGeom>
-        </p:spPr>
-      </p:pic>
+        <p:txBody>
+          <a:bodyPr wrap="square" rtlCol="0">
+            <a:spAutoFit/>
+          </a:bodyPr>
+          <a:lstStyle/>
+          <a:p>
+            <a:pPr marL="342900" indent="-342900">
+              <a:buAutoNum type="arabicPeriod"/>
+            </a:pPr>
+            <a:r>
+              <a:rPr lang="en-US" smtClean="0"/>
+              <a:t>Functional software size based effort estimation.</a:t>
+            </a:r>
+          </a:p>
+          <a:p>
+            <a:pPr marL="800100" lvl="1" indent="-342900">
+              <a:buAutoNum type="arabicPeriod"/>
+            </a:pPr>
+            <a:r>
+              <a:rPr lang="en-US" smtClean="0"/>
+              <a:t>Bayesian analysis to integrate expert estimates and sample estimates.</a:t>
+            </a:r>
+            <a:endParaRPr lang="en-US" smtClean="0"/>
+          </a:p>
+          <a:p>
+            <a:pPr marL="342900" indent="-342900">
+              <a:buAutoNum type="arabicPeriod"/>
+            </a:pPr>
+            <a:r>
+              <a:rPr lang="en-US" smtClean="0"/>
+              <a:t>Design metrics based effort estimation</a:t>
+            </a:r>
+          </a:p>
+          <a:p>
+            <a:pPr marL="800100" lvl="1" indent="-342900">
+              <a:buAutoNum type="arabicPeriod"/>
+            </a:pPr>
+            <a:r>
+              <a:rPr lang="en-US" smtClean="0"/>
+              <a:t>Regression mdoels based on significant feature selection</a:t>
+            </a:r>
+          </a:p>
+          <a:p>
+            <a:pPr marL="800100" lvl="1" indent="-342900">
+              <a:buAutoNum type="arabicPeriod"/>
+            </a:pPr>
+            <a:r>
+              <a:rPr lang="en-US" smtClean="0"/>
+              <a:t>Neural Network Model</a:t>
+            </a:r>
+          </a:p>
+          <a:p>
+            <a:r>
+              <a:rPr lang="en-US" smtClean="0"/>
+              <a:t>3.   Dynamic Models for continuous/incremental effort estimation.</a:t>
+            </a:r>
+            <a:endParaRPr lang="en-US" smtClean="0"/>
+          </a:p>
+        </p:txBody>
+      </p:sp>
     </p:spTree>
     <p:extLst>
       <p:ext uri="{BB962C8B-B14F-4D97-AF65-F5344CB8AC3E}">
-        <p14:creationId xmlns:p14="http://schemas.microsoft.com/office/powerpoint/2010/main" val="1466417654"/>
+        <p14:creationId xmlns:p14="http://schemas.microsoft.com/office/powerpoint/2010/main" val="3180299830"/>
       </p:ext>
     </p:extLst>
   </p:cSld>
@@ -5860,155 +5343,64 @@
           <a:lstStyle/>
           <a:p>
             <a:r>
-              <a:rPr lang="en-US" dirty="0" smtClean="0"/>
-              <a:t>Transaction Identification</a:t>
-            </a:r>
-            <a:endParaRPr lang="en-US" dirty="0"/>
-          </a:p>
-        </p:txBody>
-      </p:sp>
-      <p:pic>
-        <p:nvPicPr>
-          <p:cNvPr id="5" name="Content Placeholder 4"/>
-          <p:cNvPicPr>
-            <a:picLocks noGrp="1" noChangeAspect="1"/>
-          </p:cNvPicPr>
+              <a:rPr lang="en-US" smtClean="0"/>
+              <a:t>Model Estimation Accuracy</a:t>
+            </a:r>
+            <a:endParaRPr lang="en-US"/>
+          </a:p>
+        </p:txBody>
+      </p:sp>
+      <p:sp>
+        <p:nvSpPr>
+          <p:cNvPr id="3" name="Content Placeholder 2"/>
+          <p:cNvSpPr>
+            <a:spLocks noGrp="1"/>
+          </p:cNvSpPr>
           <p:nvPr>
             <p:ph idx="1"/>
           </p:nvPr>
-        </p:nvPicPr>
-        <p:blipFill>
-          <a:blip r:embed="rId2">
-            <a:extLst>
-              <a:ext uri="{28A0092B-C50C-407E-A947-70E740481C1C}">
-                <a14:useLocalDpi xmlns:a14="http://schemas.microsoft.com/office/drawing/2010/main" val="0"/>
-              </a:ext>
-            </a:extLst>
-          </a:blip>
-          <a:stretch>
-            <a:fillRect/>
-          </a:stretch>
-        </p:blipFill>
-        <p:spPr>
-          <a:xfrm>
-            <a:off x="4314786" y="1294645"/>
-            <a:ext cx="2912754" cy="1816343"/>
-          </a:xfrm>
-        </p:spPr>
-      </p:pic>
-      <p:pic>
-        <p:nvPicPr>
-          <p:cNvPr id="6" name="Picture 5"/>
-          <p:cNvPicPr>
-            <a:picLocks noChangeAspect="1"/>
-          </p:cNvPicPr>
-          <p:nvPr/>
-        </p:nvPicPr>
-        <p:blipFill>
-          <a:blip r:embed="rId3">
-            <a:extLst>
-              <a:ext uri="{28A0092B-C50C-407E-A947-70E740481C1C}">
-                <a14:useLocalDpi xmlns:a14="http://schemas.microsoft.com/office/drawing/2010/main" val="0"/>
-              </a:ext>
-            </a:extLst>
-          </a:blip>
-          <a:stretch>
-            <a:fillRect/>
-          </a:stretch>
-        </p:blipFill>
-        <p:spPr>
-          <a:xfrm>
-            <a:off x="7680148" y="1690688"/>
-            <a:ext cx="2910495" cy="2156336"/>
-          </a:xfrm>
-          <a:prstGeom prst="rect">
-            <a:avLst/>
-          </a:prstGeom>
-        </p:spPr>
-      </p:pic>
-      <p:pic>
-        <p:nvPicPr>
-          <p:cNvPr id="7" name="Picture 6"/>
-          <p:cNvPicPr>
-            <a:picLocks noChangeAspect="1"/>
-          </p:cNvPicPr>
-          <p:nvPr/>
-        </p:nvPicPr>
-        <p:blipFill>
-          <a:blip r:embed="rId4"/>
-          <a:stretch>
-            <a:fillRect/>
-          </a:stretch>
-        </p:blipFill>
-        <p:spPr>
-          <a:xfrm>
-            <a:off x="4846879" y="4040508"/>
-            <a:ext cx="3252246" cy="2123367"/>
-          </a:xfrm>
-          <a:prstGeom prst="rect">
-            <a:avLst/>
-          </a:prstGeom>
-        </p:spPr>
-      </p:pic>
-      <p:sp>
-        <p:nvSpPr>
-          <p:cNvPr id="8" name="TextBox 7"/>
-          <p:cNvSpPr txBox="1"/>
-          <p:nvPr/>
-        </p:nvSpPr>
-        <p:spPr>
-          <a:xfrm>
-            <a:off x="838200" y="1464153"/>
-            <a:ext cx="3023978" cy="1477328"/>
-          </a:xfrm>
-          <a:prstGeom prst="rect">
-            <a:avLst/>
-          </a:prstGeom>
-          <a:noFill/>
-        </p:spPr>
-        <p:txBody>
-          <a:bodyPr wrap="square" rtlCol="0">
-            <a:spAutoFit/>
-          </a:bodyPr>
-          <a:lstStyle/>
-          <a:p>
-            <a:pPr marL="342900" indent="-342900">
-              <a:buAutoNum type="arabicPeriod"/>
-            </a:pPr>
-            <a:r>
-              <a:rPr lang="en-US" dirty="0" smtClean="0"/>
-              <a:t>The rules to determine system boundaries, stimuli, components, etc.</a:t>
-            </a:r>
-          </a:p>
-          <a:p>
-            <a:pPr marL="342900" indent="-342900">
-              <a:buAutoNum type="arabicPeriod"/>
-            </a:pPr>
-            <a:r>
-              <a:rPr lang="en-US" dirty="0" smtClean="0"/>
-              <a:t>Elements are visualized by notations.</a:t>
-            </a:r>
-            <a:endParaRPr lang="en-US" dirty="0"/>
+        </p:nvSpPr>
+        <p:spPr/>
+        <p:txBody>
+          <a:bodyPr/>
+          <a:lstStyle/>
+          <a:p>
+            <a:r>
+              <a:rPr lang="en-US" smtClean="0"/>
+              <a:t>Linear Model ()</a:t>
+            </a:r>
+          </a:p>
+          <a:p>
+            <a:r>
+              <a:rPr lang="en-US" smtClean="0"/>
+              <a:t>Bayesian Model ()</a:t>
+            </a:r>
+          </a:p>
+          <a:p>
+            <a:r>
+              <a:rPr lang="en-US" smtClean="0"/>
+              <a:t>Neural Network()</a:t>
+            </a:r>
+          </a:p>
+          <a:p>
+            <a:r>
+              <a:rPr lang="en-US" smtClean="0"/>
+              <a:t>Dynamic models.</a:t>
+            </a:r>
+            <a:endParaRPr lang="en-US"/>
           </a:p>
         </p:txBody>
       </p:sp>
     </p:spTree>
     <p:extLst>
       <p:ext uri="{BB962C8B-B14F-4D97-AF65-F5344CB8AC3E}">
-        <p14:creationId xmlns:p14="http://schemas.microsoft.com/office/powerpoint/2010/main" val="770017166"/>
+        <p14:creationId xmlns:p14="http://schemas.microsoft.com/office/powerpoint/2010/main" val="3550698644"/>
       </p:ext>
     </p:extLst>
   </p:cSld>
   <p:clrMapOvr>
     <a:masterClrMapping/>
   </p:clrMapOvr>
-  <p:timing>
-    <p:tnLst>
-      <p:par>
-        <p:cTn id="1" dur="indefinite" restart="never" nodeType="tmRoot"/>
-      </p:par>
-    </p:tnLst>
-  </p:timing>
 </p:sld>
 </file>
 

</xml_diff>